<commit_message>
brief updates for playbooks
</commit_message>
<xml_diff>
--- a/Ansible_Roles/Presentation/CKB-LUG-Ansible.pptx
+++ b/Ansible_Roles/Presentation/CKB-LUG-Ansible.pptx
@@ -13,6 +13,12 @@
     <p:sldId id="263" r:id="rId7"/>
     <p:sldId id="264" r:id="rId8"/>
     <p:sldId id="266" r:id="rId9"/>
+    <p:sldId id="267" r:id="rId10"/>
+    <p:sldId id="270" r:id="rId11"/>
+    <p:sldId id="268" r:id="rId12"/>
+    <p:sldId id="271" r:id="rId13"/>
+    <p:sldId id="269" r:id="rId14"/>
+    <p:sldId id="272" r:id="rId15"/>
   </p:sldIdLst>
   <p:sldSz cx="12192000" cy="6858000"/>
   <p:notesSz cx="6858000" cy="9144000"/>
@@ -124,6 +130,12 @@
             <p14:sldId id="263"/>
             <p14:sldId id="264"/>
             <p14:sldId id="266"/>
+            <p14:sldId id="267"/>
+            <p14:sldId id="270"/>
+            <p14:sldId id="268"/>
+            <p14:sldId id="271"/>
+            <p14:sldId id="269"/>
+            <p14:sldId id="272"/>
           </p14:sldIdLst>
         </p14:section>
       </p14:sectionLst>
@@ -5751,6 +5763,355 @@
 </p:sld>
 </file>
 
+<file path=ppt/slides/slide10.xml><?xml version="1.0" encoding="utf-8"?>
+<p:sld xmlns:a="http://schemas.openxmlformats.org/drawingml/2006/main" xmlns:r="http://schemas.openxmlformats.org/officeDocument/2006/relationships" xmlns:p="http://schemas.openxmlformats.org/presentationml/2006/main">
+  <p:cSld>
+    <p:spTree>
+      <p:nvGrpSpPr>
+        <p:cNvPr id="1" name=""/>
+        <p:cNvGrpSpPr/>
+        <p:nvPr/>
+      </p:nvGrpSpPr>
+      <p:grpSpPr>
+        <a:xfrm>
+          <a:off x="0" y="0"/>
+          <a:ext cx="0" cy="0"/>
+          <a:chOff x="0" y="0"/>
+          <a:chExt cx="0" cy="0"/>
+        </a:xfrm>
+      </p:grpSpPr>
+      <p:sp>
+        <p:nvSpPr>
+          <p:cNvPr id="2" name="Title 1">
+            <a:extLst>
+              <a:ext uri="{FF2B5EF4-FFF2-40B4-BE49-F238E27FC236}">
+                <a16:creationId xmlns:a16="http://schemas.microsoft.com/office/drawing/2014/main" id="{6CABA702-67A0-5A41-825C-2729E00E8A73}"/>
+              </a:ext>
+            </a:extLst>
+          </p:cNvPr>
+          <p:cNvSpPr>
+            <a:spLocks noGrp="1"/>
+          </p:cNvSpPr>
+          <p:nvPr>
+            <p:ph type="title"/>
+          </p:nvPr>
+        </p:nvSpPr>
+        <p:spPr>
+          <a:xfrm>
+            <a:off x="1384852" y="2960921"/>
+            <a:ext cx="8610600" cy="1293028"/>
+          </a:xfrm>
+        </p:spPr>
+        <p:txBody>
+          <a:bodyPr>
+            <a:normAutofit fontScale="90000"/>
+          </a:bodyPr>
+          <a:lstStyle/>
+          <a:p>
+            <a:pPr algn="ctr"/>
+            <a:r>
+              <a:rPr lang="en-US" dirty="0"/>
+              <a:t>DEMO</a:t>
+            </a:r>
+            <a:br>
+              <a:rPr lang="en-US" dirty="0"/>
+            </a:br>
+            <a:br>
+              <a:rPr lang="en-US" dirty="0"/>
+            </a:br>
+            <a:r>
+              <a:rPr lang="en-US" dirty="0"/>
+              <a:t>Creating an Ansible ROLE</a:t>
+            </a:r>
+          </a:p>
+        </p:txBody>
+      </p:sp>
+    </p:spTree>
+    <p:extLst>
+      <p:ext uri="{BB962C8B-B14F-4D97-AF65-F5344CB8AC3E}">
+        <p14:creationId xmlns:p14="http://schemas.microsoft.com/office/powerpoint/2010/main" val="3294238171"/>
+      </p:ext>
+    </p:extLst>
+  </p:cSld>
+  <p:clrMapOvr>
+    <a:masterClrMapping/>
+  </p:clrMapOvr>
+</p:sld>
+</file>
+
+<file path=ppt/slides/slide11.xml><?xml version="1.0" encoding="utf-8"?>
+<p:sld xmlns:a="http://schemas.openxmlformats.org/drawingml/2006/main" xmlns:r="http://schemas.openxmlformats.org/officeDocument/2006/relationships" xmlns:p="http://schemas.openxmlformats.org/presentationml/2006/main">
+  <p:cSld>
+    <p:spTree>
+      <p:nvGrpSpPr>
+        <p:cNvPr id="1" name=""/>
+        <p:cNvGrpSpPr/>
+        <p:nvPr/>
+      </p:nvGrpSpPr>
+      <p:grpSpPr>
+        <a:xfrm>
+          <a:off x="0" y="0"/>
+          <a:ext cx="0" cy="0"/>
+          <a:chOff x="0" y="0"/>
+          <a:chExt cx="0" cy="0"/>
+        </a:xfrm>
+      </p:grpSpPr>
+      <p:sp>
+        <p:nvSpPr>
+          <p:cNvPr id="2" name="Title 1">
+            <a:extLst>
+              <a:ext uri="{FF2B5EF4-FFF2-40B4-BE49-F238E27FC236}">
+                <a16:creationId xmlns:a16="http://schemas.microsoft.com/office/drawing/2014/main" id="{6CABA702-67A0-5A41-825C-2729E00E8A73}"/>
+              </a:ext>
+            </a:extLst>
+          </p:cNvPr>
+          <p:cNvSpPr>
+            <a:spLocks noGrp="1"/>
+          </p:cNvSpPr>
+          <p:nvPr>
+            <p:ph type="title"/>
+          </p:nvPr>
+        </p:nvSpPr>
+        <p:spPr/>
+        <p:txBody>
+          <a:bodyPr/>
+          <a:lstStyle/>
+          <a:p>
+            <a:r>
+              <a:rPr lang="en-US" dirty="0"/>
+              <a:t>Publishing an Ansible ROLE</a:t>
+            </a:r>
+          </a:p>
+        </p:txBody>
+      </p:sp>
+    </p:spTree>
+    <p:extLst>
+      <p:ext uri="{BB962C8B-B14F-4D97-AF65-F5344CB8AC3E}">
+        <p14:creationId xmlns:p14="http://schemas.microsoft.com/office/powerpoint/2010/main" val="4239218780"/>
+      </p:ext>
+    </p:extLst>
+  </p:cSld>
+  <p:clrMapOvr>
+    <a:masterClrMapping/>
+  </p:clrMapOvr>
+</p:sld>
+</file>
+
+<file path=ppt/slides/slide12.xml><?xml version="1.0" encoding="utf-8"?>
+<p:sld xmlns:a="http://schemas.openxmlformats.org/drawingml/2006/main" xmlns:r="http://schemas.openxmlformats.org/officeDocument/2006/relationships" xmlns:p="http://schemas.openxmlformats.org/presentationml/2006/main">
+  <p:cSld>
+    <p:spTree>
+      <p:nvGrpSpPr>
+        <p:cNvPr id="1" name=""/>
+        <p:cNvGrpSpPr/>
+        <p:nvPr/>
+      </p:nvGrpSpPr>
+      <p:grpSpPr>
+        <a:xfrm>
+          <a:off x="0" y="0"/>
+          <a:ext cx="0" cy="0"/>
+          <a:chOff x="0" y="0"/>
+          <a:chExt cx="0" cy="0"/>
+        </a:xfrm>
+      </p:grpSpPr>
+      <p:sp>
+        <p:nvSpPr>
+          <p:cNvPr id="2" name="Title 1">
+            <a:extLst>
+              <a:ext uri="{FF2B5EF4-FFF2-40B4-BE49-F238E27FC236}">
+                <a16:creationId xmlns:a16="http://schemas.microsoft.com/office/drawing/2014/main" id="{6CABA702-67A0-5A41-825C-2729E00E8A73}"/>
+              </a:ext>
+            </a:extLst>
+          </p:cNvPr>
+          <p:cNvSpPr>
+            <a:spLocks noGrp="1"/>
+          </p:cNvSpPr>
+          <p:nvPr>
+            <p:ph type="title"/>
+          </p:nvPr>
+        </p:nvSpPr>
+        <p:spPr>
+          <a:xfrm>
+            <a:off x="1384852" y="2960921"/>
+            <a:ext cx="8610600" cy="1293028"/>
+          </a:xfrm>
+        </p:spPr>
+        <p:txBody>
+          <a:bodyPr>
+            <a:normAutofit fontScale="90000"/>
+          </a:bodyPr>
+          <a:lstStyle/>
+          <a:p>
+            <a:pPr algn="ctr"/>
+            <a:r>
+              <a:rPr lang="en-US" dirty="0"/>
+              <a:t>DEMO</a:t>
+            </a:r>
+            <a:br>
+              <a:rPr lang="en-US" dirty="0"/>
+            </a:br>
+            <a:br>
+              <a:rPr lang="en-US" dirty="0"/>
+            </a:br>
+            <a:r>
+              <a:rPr lang="en-US" dirty="0"/>
+              <a:t>Publishing an Ansible ROLE</a:t>
+            </a:r>
+          </a:p>
+        </p:txBody>
+      </p:sp>
+    </p:spTree>
+    <p:extLst>
+      <p:ext uri="{BB962C8B-B14F-4D97-AF65-F5344CB8AC3E}">
+        <p14:creationId xmlns:p14="http://schemas.microsoft.com/office/powerpoint/2010/main" val="4276166831"/>
+      </p:ext>
+    </p:extLst>
+  </p:cSld>
+  <p:clrMapOvr>
+    <a:masterClrMapping/>
+  </p:clrMapOvr>
+</p:sld>
+</file>
+
+<file path=ppt/slides/slide13.xml><?xml version="1.0" encoding="utf-8"?>
+<p:sld xmlns:a="http://schemas.openxmlformats.org/drawingml/2006/main" xmlns:r="http://schemas.openxmlformats.org/officeDocument/2006/relationships" xmlns:p="http://schemas.openxmlformats.org/presentationml/2006/main">
+  <p:cSld>
+    <p:spTree>
+      <p:nvGrpSpPr>
+        <p:cNvPr id="1" name=""/>
+        <p:cNvGrpSpPr/>
+        <p:nvPr/>
+      </p:nvGrpSpPr>
+      <p:grpSpPr>
+        <a:xfrm>
+          <a:off x="0" y="0"/>
+          <a:ext cx="0" cy="0"/>
+          <a:chOff x="0" y="0"/>
+          <a:chExt cx="0" cy="0"/>
+        </a:xfrm>
+      </p:grpSpPr>
+      <p:sp>
+        <p:nvSpPr>
+          <p:cNvPr id="2" name="Title 1">
+            <a:extLst>
+              <a:ext uri="{FF2B5EF4-FFF2-40B4-BE49-F238E27FC236}">
+                <a16:creationId xmlns:a16="http://schemas.microsoft.com/office/drawing/2014/main" id="{6CABA702-67A0-5A41-825C-2729E00E8A73}"/>
+              </a:ext>
+            </a:extLst>
+          </p:cNvPr>
+          <p:cNvSpPr>
+            <a:spLocks noGrp="1"/>
+          </p:cNvSpPr>
+          <p:nvPr>
+            <p:ph type="title"/>
+          </p:nvPr>
+        </p:nvSpPr>
+        <p:spPr/>
+        <p:txBody>
+          <a:bodyPr/>
+          <a:lstStyle/>
+          <a:p>
+            <a:r>
+              <a:rPr lang="en-US" dirty="0"/>
+              <a:t>SCAP Workbench and </a:t>
+            </a:r>
+            <a:r>
+              <a:rPr lang="en-US" dirty="0" err="1"/>
+              <a:t>OpenSCAP</a:t>
+            </a:r>
+            <a:endParaRPr lang="en-US" dirty="0"/>
+          </a:p>
+        </p:txBody>
+      </p:sp>
+    </p:spTree>
+    <p:extLst>
+      <p:ext uri="{BB962C8B-B14F-4D97-AF65-F5344CB8AC3E}">
+        <p14:creationId xmlns:p14="http://schemas.microsoft.com/office/powerpoint/2010/main" val="1585771818"/>
+      </p:ext>
+    </p:extLst>
+  </p:cSld>
+  <p:clrMapOvr>
+    <a:masterClrMapping/>
+  </p:clrMapOvr>
+</p:sld>
+</file>
+
+<file path=ppt/slides/slide14.xml><?xml version="1.0" encoding="utf-8"?>
+<p:sld xmlns:a="http://schemas.openxmlformats.org/drawingml/2006/main" xmlns:r="http://schemas.openxmlformats.org/officeDocument/2006/relationships" xmlns:p="http://schemas.openxmlformats.org/presentationml/2006/main">
+  <p:cSld>
+    <p:spTree>
+      <p:nvGrpSpPr>
+        <p:cNvPr id="1" name=""/>
+        <p:cNvGrpSpPr/>
+        <p:nvPr/>
+      </p:nvGrpSpPr>
+      <p:grpSpPr>
+        <a:xfrm>
+          <a:off x="0" y="0"/>
+          <a:ext cx="0" cy="0"/>
+          <a:chOff x="0" y="0"/>
+          <a:chExt cx="0" cy="0"/>
+        </a:xfrm>
+      </p:grpSpPr>
+      <p:sp>
+        <p:nvSpPr>
+          <p:cNvPr id="2" name="Title 1">
+            <a:extLst>
+              <a:ext uri="{FF2B5EF4-FFF2-40B4-BE49-F238E27FC236}">
+                <a16:creationId xmlns:a16="http://schemas.microsoft.com/office/drawing/2014/main" id="{6CABA702-67A0-5A41-825C-2729E00E8A73}"/>
+              </a:ext>
+            </a:extLst>
+          </p:cNvPr>
+          <p:cNvSpPr>
+            <a:spLocks noGrp="1"/>
+          </p:cNvSpPr>
+          <p:nvPr>
+            <p:ph type="title"/>
+          </p:nvPr>
+        </p:nvSpPr>
+        <p:spPr>
+          <a:xfrm>
+            <a:off x="1384852" y="2960921"/>
+            <a:ext cx="10114722" cy="1293028"/>
+          </a:xfrm>
+        </p:spPr>
+        <p:txBody>
+          <a:bodyPr>
+            <a:normAutofit fontScale="90000"/>
+          </a:bodyPr>
+          <a:lstStyle/>
+          <a:p>
+            <a:pPr algn="ctr"/>
+            <a:r>
+              <a:rPr lang="en-US" dirty="0"/>
+              <a:t>DEMO</a:t>
+            </a:r>
+            <a:br>
+              <a:rPr lang="en-US" dirty="0"/>
+            </a:br>
+            <a:br>
+              <a:rPr lang="en-US" dirty="0"/>
+            </a:br>
+            <a:r>
+              <a:rPr lang="en-US" dirty="0"/>
+              <a:t>using SCAP Workbench and Ansible</a:t>
+            </a:r>
+          </a:p>
+        </p:txBody>
+      </p:sp>
+    </p:spTree>
+    <p:extLst>
+      <p:ext uri="{BB962C8B-B14F-4D97-AF65-F5344CB8AC3E}">
+        <p14:creationId xmlns:p14="http://schemas.microsoft.com/office/powerpoint/2010/main" val="4217273213"/>
+      </p:ext>
+    </p:extLst>
+  </p:cSld>
+  <p:clrMapOvr>
+    <a:masterClrMapping/>
+  </p:clrMapOvr>
+</p:sld>
+</file>
+
 <file path=ppt/slides/slide2.xml><?xml version="1.0" encoding="utf-8"?>
 <p:sld xmlns:a="http://schemas.openxmlformats.org/drawingml/2006/main" xmlns:r="http://schemas.openxmlformats.org/officeDocument/2006/relationships" xmlns:p="http://schemas.openxmlformats.org/presentationml/2006/main">
   <p:cSld>
@@ -7142,6 +7503,64 @@
     <p:extLst>
       <p:ext uri="{BB962C8B-B14F-4D97-AF65-F5344CB8AC3E}">
         <p14:creationId xmlns:p14="http://schemas.microsoft.com/office/powerpoint/2010/main" val="3570470727"/>
+      </p:ext>
+    </p:extLst>
+  </p:cSld>
+  <p:clrMapOvr>
+    <a:masterClrMapping/>
+  </p:clrMapOvr>
+</p:sld>
+</file>
+
+<file path=ppt/slides/slide9.xml><?xml version="1.0" encoding="utf-8"?>
+<p:sld xmlns:a="http://schemas.openxmlformats.org/drawingml/2006/main" xmlns:r="http://schemas.openxmlformats.org/officeDocument/2006/relationships" xmlns:p="http://schemas.openxmlformats.org/presentationml/2006/main">
+  <p:cSld>
+    <p:spTree>
+      <p:nvGrpSpPr>
+        <p:cNvPr id="1" name=""/>
+        <p:cNvGrpSpPr/>
+        <p:nvPr/>
+      </p:nvGrpSpPr>
+      <p:grpSpPr>
+        <a:xfrm>
+          <a:off x="0" y="0"/>
+          <a:ext cx="0" cy="0"/>
+          <a:chOff x="0" y="0"/>
+          <a:chExt cx="0" cy="0"/>
+        </a:xfrm>
+      </p:grpSpPr>
+      <p:sp>
+        <p:nvSpPr>
+          <p:cNvPr id="2" name="Title 1">
+            <a:extLst>
+              <a:ext uri="{FF2B5EF4-FFF2-40B4-BE49-F238E27FC236}">
+                <a16:creationId xmlns:a16="http://schemas.microsoft.com/office/drawing/2014/main" id="{6CABA702-67A0-5A41-825C-2729E00E8A73}"/>
+              </a:ext>
+            </a:extLst>
+          </p:cNvPr>
+          <p:cNvSpPr>
+            <a:spLocks noGrp="1"/>
+          </p:cNvSpPr>
+          <p:nvPr>
+            <p:ph type="title"/>
+          </p:nvPr>
+        </p:nvSpPr>
+        <p:spPr/>
+        <p:txBody>
+          <a:bodyPr/>
+          <a:lstStyle/>
+          <a:p>
+            <a:r>
+              <a:rPr lang="en-US" dirty="0"/>
+              <a:t>Creating an Ansible ROLE</a:t>
+            </a:r>
+          </a:p>
+        </p:txBody>
+      </p:sp>
+    </p:spTree>
+    <p:extLst>
+      <p:ext uri="{BB962C8B-B14F-4D97-AF65-F5344CB8AC3E}">
+        <p14:creationId xmlns:p14="http://schemas.microsoft.com/office/powerpoint/2010/main" val="3982351215"/>
       </p:ext>
     </p:extLst>
   </p:cSld>

</xml_diff>

<commit_message>
Finalized Presentation and created PDF
</commit_message>
<xml_diff>
--- a/Ansible_Roles/Presentation/CKB-LUG-Ansible.pptx
+++ b/Ansible_Roles/Presentation/CKB-LUG-Ansible.pptx
@@ -14,11 +14,13 @@
     <p:sldId id="264" r:id="rId8"/>
     <p:sldId id="266" r:id="rId9"/>
     <p:sldId id="267" r:id="rId10"/>
-    <p:sldId id="270" r:id="rId11"/>
-    <p:sldId id="268" r:id="rId12"/>
-    <p:sldId id="271" r:id="rId13"/>
-    <p:sldId id="269" r:id="rId14"/>
-    <p:sldId id="272" r:id="rId15"/>
+    <p:sldId id="273" r:id="rId11"/>
+    <p:sldId id="274" r:id="rId12"/>
+    <p:sldId id="270" r:id="rId13"/>
+    <p:sldId id="268" r:id="rId14"/>
+    <p:sldId id="271" r:id="rId15"/>
+    <p:sldId id="269" r:id="rId16"/>
+    <p:sldId id="272" r:id="rId17"/>
   </p:sldIdLst>
   <p:sldSz cx="12192000" cy="6858000"/>
   <p:notesSz cx="6858000" cy="9144000"/>
@@ -131,6 +133,8 @@
             <p14:sldId id="264"/>
             <p14:sldId id="266"/>
             <p14:sldId id="267"/>
+            <p14:sldId id="273"/>
+            <p14:sldId id="274"/>
             <p14:sldId id="270"/>
             <p14:sldId id="268"/>
             <p14:sldId id="271"/>
@@ -139,6 +143,9 @@
           </p14:sldIdLst>
         </p14:section>
       </p14:sectionLst>
+    </p:ext>
+    <p:ext uri="{EFAFB233-063F-42B5-8137-9DF3F51BA10A}">
+      <p15:sldGuideLst xmlns:p15="http://schemas.microsoft.com/office/powerpoint/2012/main"/>
     </p:ext>
   </p:extLst>
 </p:presentation>
@@ -314,7 +321,7 @@
           <a:p>
             <a:fld id="{48A87A34-81AB-432B-8DAE-1953F412C126}" type="datetimeFigureOut">
               <a:rPr lang="en-US" dirty="0"/>
-              <a:t>3/7/21</a:t>
+              <a:t>3/8/21</a:t>
             </a:fld>
             <a:endParaRPr lang="en-US" dirty="0"/>
           </a:p>
@@ -576,7 +583,7 @@
           <a:p>
             <a:fld id="{48A87A34-81AB-432B-8DAE-1953F412C126}" type="datetimeFigureOut">
               <a:rPr lang="en-US" dirty="0"/>
-              <a:t>3/7/21</a:t>
+              <a:t>3/8/21</a:t>
             </a:fld>
             <a:endParaRPr lang="en-US" dirty="0"/>
           </a:p>
@@ -803,7 +810,7 @@
             <a:fld id="{48A87A34-81AB-432B-8DAE-1953F412C126}" type="datetimeFigureOut">
               <a:rPr lang="en-US" dirty="0"/>
               <a:pPr/>
-              <a:t>3/7/21</a:t>
+              <a:t>3/8/21</a:t>
             </a:fld>
             <a:endParaRPr lang="en-US" dirty="0"/>
           </a:p>
@@ -1109,7 +1116,7 @@
             <a:fld id="{48A87A34-81AB-432B-8DAE-1953F412C126}" type="datetimeFigureOut">
               <a:rPr lang="en-US" dirty="0"/>
               <a:pPr/>
-              <a:t>3/7/21</a:t>
+              <a:t>3/8/21</a:t>
             </a:fld>
             <a:endParaRPr lang="en-US" dirty="0"/>
           </a:p>
@@ -1578,7 +1585,7 @@
             <a:fld id="{48A87A34-81AB-432B-8DAE-1953F412C126}" type="datetimeFigureOut">
               <a:rPr lang="en-US" dirty="0"/>
               <a:pPr/>
-              <a:t>3/7/21</a:t>
+              <a:t>3/8/21</a:t>
             </a:fld>
             <a:endParaRPr lang="en-US" dirty="0"/>
           </a:p>
@@ -2120,7 +2127,7 @@
           <a:p>
             <a:fld id="{48A87A34-81AB-432B-8DAE-1953F412C126}" type="datetimeFigureOut">
               <a:rPr lang="en-US" dirty="0"/>
-              <a:t>3/7/21</a:t>
+              <a:t>3/8/21</a:t>
             </a:fld>
             <a:endParaRPr lang="en-US" dirty="0"/>
           </a:p>
@@ -2889,7 +2896,7 @@
           <a:p>
             <a:fld id="{48A87A34-81AB-432B-8DAE-1953F412C126}" type="datetimeFigureOut">
               <a:rPr lang="en-US" dirty="0"/>
-              <a:t>3/7/21</a:t>
+              <a:t>3/8/21</a:t>
             </a:fld>
             <a:endParaRPr lang="en-US" dirty="0"/>
           </a:p>
@@ -3059,7 +3066,7 @@
           <a:p>
             <a:fld id="{48A87A34-81AB-432B-8DAE-1953F412C126}" type="datetimeFigureOut">
               <a:rPr lang="en-US" dirty="0"/>
-              <a:t>3/7/21</a:t>
+              <a:t>3/8/21</a:t>
             </a:fld>
             <a:endParaRPr lang="en-US" dirty="0"/>
           </a:p>
@@ -3278,7 +3285,7 @@
             <a:fld id="{48A87A34-81AB-432B-8DAE-1953F412C126}" type="datetimeFigureOut">
               <a:rPr lang="en-US" dirty="0"/>
               <a:pPr/>
-              <a:t>3/7/21</a:t>
+              <a:t>3/8/21</a:t>
             </a:fld>
             <a:endParaRPr lang="en-US" dirty="0"/>
           </a:p>
@@ -3453,7 +3460,7 @@
           <a:p>
             <a:fld id="{48A87A34-81AB-432B-8DAE-1953F412C126}" type="datetimeFigureOut">
               <a:rPr lang="en-US" dirty="0"/>
-              <a:t>3/7/21</a:t>
+              <a:t>3/8/21</a:t>
             </a:fld>
             <a:endParaRPr lang="en-US" dirty="0"/>
           </a:p>
@@ -3738,7 +3745,7 @@
             <a:fld id="{48A87A34-81AB-432B-8DAE-1953F412C126}" type="datetimeFigureOut">
               <a:rPr lang="en-US" dirty="0"/>
               <a:pPr/>
-              <a:t>3/7/21</a:t>
+              <a:t>3/8/21</a:t>
             </a:fld>
             <a:endParaRPr lang="en-US" dirty="0"/>
           </a:p>
@@ -3975,7 +3982,7 @@
           <a:p>
             <a:fld id="{48A87A34-81AB-432B-8DAE-1953F412C126}" type="datetimeFigureOut">
               <a:rPr lang="en-US" dirty="0"/>
-              <a:t>3/7/21</a:t>
+              <a:t>3/8/21</a:t>
             </a:fld>
             <a:endParaRPr lang="en-US" dirty="0"/>
           </a:p>
@@ -4349,7 +4356,7 @@
           <a:p>
             <a:fld id="{48A87A34-81AB-432B-8DAE-1953F412C126}" type="datetimeFigureOut">
               <a:rPr lang="en-US" dirty="0"/>
-              <a:t>3/7/21</a:t>
+              <a:t>3/8/21</a:t>
             </a:fld>
             <a:endParaRPr lang="en-US" dirty="0"/>
           </a:p>
@@ -4462,7 +4469,7 @@
           <a:p>
             <a:fld id="{48A87A34-81AB-432B-8DAE-1953F412C126}" type="datetimeFigureOut">
               <a:rPr lang="en-US" dirty="0"/>
-              <a:t>3/7/21</a:t>
+              <a:t>3/8/21</a:t>
             </a:fld>
             <a:endParaRPr lang="en-US" dirty="0"/>
           </a:p>
@@ -4552,7 +4559,7 @@
           <a:p>
             <a:fld id="{48A87A34-81AB-432B-8DAE-1953F412C126}" type="datetimeFigureOut">
               <a:rPr lang="en-US" dirty="0"/>
-              <a:t>3/7/21</a:t>
+              <a:t>3/8/21</a:t>
             </a:fld>
             <a:endParaRPr lang="en-US" dirty="0"/>
           </a:p>
@@ -4796,7 +4803,7 @@
           <a:p>
             <a:fld id="{48A87A34-81AB-432B-8DAE-1953F412C126}" type="datetimeFigureOut">
               <a:rPr lang="en-US" dirty="0"/>
-              <a:t>3/7/21</a:t>
+              <a:t>3/8/21</a:t>
             </a:fld>
             <a:endParaRPr lang="en-US" dirty="0"/>
           </a:p>
@@ -5048,7 +5055,7 @@
           <a:p>
             <a:fld id="{48A87A34-81AB-432B-8DAE-1953F412C126}" type="datetimeFigureOut">
               <a:rPr lang="en-US" dirty="0"/>
-              <a:t>3/7/21</a:t>
+              <a:t>3/8/21</a:t>
             </a:fld>
             <a:endParaRPr lang="en-US" dirty="0"/>
           </a:p>
@@ -5287,7 +5294,7 @@
             <a:fld id="{48A87A34-81AB-432B-8DAE-1953F412C126}" type="datetimeFigureOut">
               <a:rPr lang="en-US" dirty="0"/>
               <a:pPr/>
-              <a:t>3/7/21</a:t>
+              <a:t>3/8/21</a:t>
             </a:fld>
             <a:endParaRPr lang="en-US" dirty="0"/>
           </a:p>
@@ -5710,14 +5717,21 @@
             <p:ph type="ctrTitle"/>
           </p:nvPr>
         </p:nvSpPr>
-        <p:spPr/>
-        <p:txBody>
-          <a:bodyPr/>
+        <p:spPr>
+          <a:xfrm>
+            <a:off x="1037967" y="1803405"/>
+            <a:ext cx="10144897" cy="1825096"/>
+          </a:xfrm>
+        </p:spPr>
+        <p:txBody>
+          <a:bodyPr>
+            <a:normAutofit/>
+          </a:bodyPr>
           <a:lstStyle/>
           <a:p>
             <a:r>
               <a:rPr lang="en-US" dirty="0"/>
-              <a:t>Publishing Ansible Roles</a:t>
+              <a:t>Publishing Ansible Roles &amp; SCAP Refresher</a:t>
             </a:r>
           </a:p>
         </p:txBody>
@@ -5798,30 +5812,379 @@
         </p:nvSpPr>
         <p:spPr>
           <a:xfrm>
-            <a:off x="1384852" y="2960921"/>
+            <a:off x="3056238" y="97108"/>
             <a:ext cx="8610600" cy="1293028"/>
           </a:xfrm>
         </p:spPr>
         <p:txBody>
-          <a:bodyPr>
-            <a:normAutofit fontScale="90000"/>
+          <a:bodyPr/>
+          <a:lstStyle/>
+          <a:p>
+            <a:r>
+              <a:rPr lang="en-US" dirty="0"/>
+              <a:t>Ansible ROLE Structure</a:t>
+            </a:r>
+          </a:p>
+        </p:txBody>
+      </p:sp>
+      <p:sp>
+        <p:nvSpPr>
+          <p:cNvPr id="3" name="TextBox 2">
+            <a:extLst>
+              <a:ext uri="{FF2B5EF4-FFF2-40B4-BE49-F238E27FC236}">
+                <a16:creationId xmlns:a16="http://schemas.microsoft.com/office/drawing/2014/main" id="{AFAE4272-C6A2-884B-B73D-9F60EB8217CA}"/>
+              </a:ext>
+            </a:extLst>
+          </p:cNvPr>
+          <p:cNvSpPr txBox="1"/>
+          <p:nvPr/>
+        </p:nvSpPr>
+        <p:spPr>
+          <a:xfrm>
+            <a:off x="1336230" y="1390136"/>
+            <a:ext cx="10038522" cy="5170646"/>
+          </a:xfrm>
+          <a:prstGeom prst="rect">
+            <a:avLst/>
+          </a:prstGeom>
+          <a:solidFill>
+            <a:schemeClr val="bg2">
+              <a:lumMod val="20000"/>
+              <a:lumOff val="80000"/>
+            </a:schemeClr>
+          </a:solidFill>
+        </p:spPr>
+        <p:txBody>
+          <a:bodyPr wrap="square" rtlCol="0">
+            <a:spAutoFit/>
           </a:bodyPr>
           <a:lstStyle/>
           <a:p>
-            <a:pPr algn="ctr"/>
-            <a:r>
-              <a:rPr lang="en-US" dirty="0"/>
-              <a:t>DEMO</a:t>
-            </a:r>
-            <a:br>
-              <a:rPr lang="en-US" dirty="0"/>
-            </a:br>
-            <a:br>
-              <a:rPr lang="en-US" dirty="0"/>
-            </a:br>
-            <a:r>
-              <a:rPr lang="en-US" dirty="0"/>
-              <a:t>Creating an Ansible ROLE</a:t>
+            <a:r>
+              <a:rPr lang="en-US" sz="1600" b="1" dirty="0">
+                <a:solidFill>
+                  <a:schemeClr val="bg1"/>
+                </a:solidFill>
+              </a:rPr>
+              <a:t>[</a:t>
+            </a:r>
+            <a:r>
+              <a:rPr lang="en-US" sz="1600" b="1" dirty="0" err="1">
+                <a:solidFill>
+                  <a:schemeClr val="bg1"/>
+                </a:solidFill>
+              </a:rPr>
+              <a:t>student@workstation</a:t>
+            </a:r>
+            <a:r>
+              <a:rPr lang="en-US" sz="1600" b="1" dirty="0">
+                <a:solidFill>
+                  <a:schemeClr val="bg1"/>
+                </a:solidFill>
+              </a:rPr>
+              <a:t> ROLES]$ tree </a:t>
+            </a:r>
+            <a:r>
+              <a:rPr lang="en-US" sz="1600" b="1" dirty="0" err="1">
+                <a:solidFill>
+                  <a:schemeClr val="bg1"/>
+                </a:solidFill>
+              </a:rPr>
+              <a:t>My_Role</a:t>
+            </a:r>
+            <a:r>
+              <a:rPr lang="en-US" sz="1600" b="1" dirty="0">
+                <a:solidFill>
+                  <a:schemeClr val="bg1"/>
+                </a:solidFill>
+              </a:rPr>
+              <a:t>/</a:t>
+            </a:r>
+          </a:p>
+          <a:p>
+            <a:r>
+              <a:rPr lang="en-US" sz="1600" dirty="0" err="1">
+                <a:solidFill>
+                  <a:schemeClr val="bg1"/>
+                </a:solidFill>
+              </a:rPr>
+              <a:t>My_Role</a:t>
+            </a:r>
+            <a:r>
+              <a:rPr lang="en-US" sz="1600" dirty="0">
+                <a:solidFill>
+                  <a:schemeClr val="bg1"/>
+                </a:solidFill>
+              </a:rPr>
+              <a:t>/</a:t>
+            </a:r>
+          </a:p>
+          <a:p>
+            <a:r>
+              <a:rPr lang="en-US" sz="1600" dirty="0">
+                <a:solidFill>
+                  <a:schemeClr val="bg1"/>
+                </a:solidFill>
+              </a:rPr>
+              <a:t>├── defaults</a:t>
+            </a:r>
+          </a:p>
+          <a:p>
+            <a:r>
+              <a:rPr lang="en-US" sz="1600" dirty="0">
+                <a:solidFill>
+                  <a:schemeClr val="bg1"/>
+                </a:solidFill>
+              </a:rPr>
+              <a:t>│   └── </a:t>
+            </a:r>
+            <a:r>
+              <a:rPr lang="en-US" sz="1600" dirty="0" err="1">
+                <a:solidFill>
+                  <a:schemeClr val="bg1"/>
+                </a:solidFill>
+              </a:rPr>
+              <a:t>main.yml</a:t>
+            </a:r>
+            <a:endParaRPr lang="en-US" sz="1600" dirty="0">
+              <a:solidFill>
+                <a:schemeClr val="bg1"/>
+              </a:solidFill>
+            </a:endParaRPr>
+          </a:p>
+          <a:p>
+            <a:r>
+              <a:rPr lang="en-US" sz="1600" dirty="0">
+                <a:solidFill>
+                  <a:schemeClr val="bg1"/>
+                </a:solidFill>
+              </a:rPr>
+              <a:t>├── files</a:t>
+            </a:r>
+          </a:p>
+          <a:p>
+            <a:r>
+              <a:rPr lang="en-US" sz="1600" dirty="0">
+                <a:solidFill>
+                  <a:schemeClr val="bg1"/>
+                </a:solidFill>
+              </a:rPr>
+              <a:t>├── handlers</a:t>
+            </a:r>
+          </a:p>
+          <a:p>
+            <a:r>
+              <a:rPr lang="en-US" sz="1600" dirty="0">
+                <a:solidFill>
+                  <a:schemeClr val="bg1"/>
+                </a:solidFill>
+              </a:rPr>
+              <a:t>│   └── </a:t>
+            </a:r>
+            <a:r>
+              <a:rPr lang="en-US" sz="1600" dirty="0" err="1">
+                <a:solidFill>
+                  <a:schemeClr val="bg1"/>
+                </a:solidFill>
+              </a:rPr>
+              <a:t>main.yml</a:t>
+            </a:r>
+            <a:endParaRPr lang="en-US" sz="1600" dirty="0">
+              <a:solidFill>
+                <a:schemeClr val="bg1"/>
+              </a:solidFill>
+            </a:endParaRPr>
+          </a:p>
+          <a:p>
+            <a:r>
+              <a:rPr lang="en-US" sz="1600" dirty="0">
+                <a:solidFill>
+                  <a:schemeClr val="bg1"/>
+                </a:solidFill>
+              </a:rPr>
+              <a:t>├── meta</a:t>
+            </a:r>
+          </a:p>
+          <a:p>
+            <a:r>
+              <a:rPr lang="en-US" sz="1600" dirty="0">
+                <a:solidFill>
+                  <a:schemeClr val="bg1"/>
+                </a:solidFill>
+              </a:rPr>
+              <a:t>│   └── </a:t>
+            </a:r>
+            <a:r>
+              <a:rPr lang="en-US" sz="1600" dirty="0" err="1">
+                <a:solidFill>
+                  <a:schemeClr val="bg1"/>
+                </a:solidFill>
+              </a:rPr>
+              <a:t>main.yml</a:t>
+            </a:r>
+            <a:endParaRPr lang="en-US" sz="1600" dirty="0">
+              <a:solidFill>
+                <a:schemeClr val="bg1"/>
+              </a:solidFill>
+            </a:endParaRPr>
+          </a:p>
+          <a:p>
+            <a:r>
+              <a:rPr lang="en-US" sz="1600" dirty="0">
+                <a:solidFill>
+                  <a:schemeClr val="bg1"/>
+                </a:solidFill>
+              </a:rPr>
+              <a:t>├── </a:t>
+            </a:r>
+            <a:r>
+              <a:rPr lang="en-US" sz="1600" dirty="0" err="1">
+                <a:solidFill>
+                  <a:schemeClr val="bg1"/>
+                </a:solidFill>
+              </a:rPr>
+              <a:t>README.md</a:t>
+            </a:r>
+            <a:endParaRPr lang="en-US" sz="1600" dirty="0">
+              <a:solidFill>
+                <a:schemeClr val="bg1"/>
+              </a:solidFill>
+            </a:endParaRPr>
+          </a:p>
+          <a:p>
+            <a:r>
+              <a:rPr lang="en-US" sz="1600" dirty="0">
+                <a:solidFill>
+                  <a:schemeClr val="bg1"/>
+                </a:solidFill>
+              </a:rPr>
+              <a:t>├── tasks</a:t>
+            </a:r>
+          </a:p>
+          <a:p>
+            <a:r>
+              <a:rPr lang="en-US" sz="1600" dirty="0">
+                <a:solidFill>
+                  <a:schemeClr val="bg1"/>
+                </a:solidFill>
+              </a:rPr>
+              <a:t>│   └── </a:t>
+            </a:r>
+            <a:r>
+              <a:rPr lang="en-US" sz="1600" dirty="0" err="1">
+                <a:solidFill>
+                  <a:schemeClr val="bg1"/>
+                </a:solidFill>
+              </a:rPr>
+              <a:t>main.yml</a:t>
+            </a:r>
+            <a:endParaRPr lang="en-US" sz="1600" dirty="0">
+              <a:solidFill>
+                <a:schemeClr val="bg1"/>
+              </a:solidFill>
+            </a:endParaRPr>
+          </a:p>
+          <a:p>
+            <a:r>
+              <a:rPr lang="en-US" sz="1600" dirty="0">
+                <a:solidFill>
+                  <a:schemeClr val="bg1"/>
+                </a:solidFill>
+              </a:rPr>
+              <a:t>├── templates</a:t>
+            </a:r>
+          </a:p>
+          <a:p>
+            <a:r>
+              <a:rPr lang="en-US" sz="1600" dirty="0">
+                <a:solidFill>
+                  <a:schemeClr val="bg1"/>
+                </a:solidFill>
+              </a:rPr>
+              <a:t>├── tests</a:t>
+            </a:r>
+          </a:p>
+          <a:p>
+            <a:r>
+              <a:rPr lang="en-US" sz="1600" dirty="0">
+                <a:solidFill>
+                  <a:schemeClr val="bg1"/>
+                </a:solidFill>
+              </a:rPr>
+              <a:t>│   ├── inventory</a:t>
+            </a:r>
+          </a:p>
+          <a:p>
+            <a:r>
+              <a:rPr lang="en-US" sz="1600" dirty="0">
+                <a:solidFill>
+                  <a:schemeClr val="bg1"/>
+                </a:solidFill>
+              </a:rPr>
+              <a:t>│   └── </a:t>
+            </a:r>
+            <a:r>
+              <a:rPr lang="en-US" sz="1600" dirty="0" err="1">
+                <a:solidFill>
+                  <a:schemeClr val="bg1"/>
+                </a:solidFill>
+              </a:rPr>
+              <a:t>test.yml</a:t>
+            </a:r>
+            <a:endParaRPr lang="en-US" sz="1600" dirty="0">
+              <a:solidFill>
+                <a:schemeClr val="bg1"/>
+              </a:solidFill>
+            </a:endParaRPr>
+          </a:p>
+          <a:p>
+            <a:r>
+              <a:rPr lang="en-US" sz="1600" dirty="0">
+                <a:solidFill>
+                  <a:schemeClr val="bg1"/>
+                </a:solidFill>
+              </a:rPr>
+              <a:t>└── vars</a:t>
+            </a:r>
+          </a:p>
+          <a:p>
+            <a:r>
+              <a:rPr lang="en-US" sz="1600" dirty="0">
+                <a:solidFill>
+                  <a:schemeClr val="bg1"/>
+                </a:solidFill>
+              </a:rPr>
+              <a:t>    └── </a:t>
+            </a:r>
+            <a:r>
+              <a:rPr lang="en-US" sz="1600" dirty="0" err="1">
+                <a:solidFill>
+                  <a:schemeClr val="bg1"/>
+                </a:solidFill>
+              </a:rPr>
+              <a:t>main.yml</a:t>
+            </a:r>
+            <a:endParaRPr lang="en-US" sz="1600" dirty="0">
+              <a:solidFill>
+                <a:schemeClr val="bg1"/>
+              </a:solidFill>
+            </a:endParaRPr>
+          </a:p>
+          <a:p>
+            <a:endParaRPr lang="en-US" sz="1600" dirty="0">
+              <a:solidFill>
+                <a:schemeClr val="bg1"/>
+              </a:solidFill>
+            </a:endParaRPr>
+          </a:p>
+          <a:p>
+            <a:r>
+              <a:rPr lang="en-US" sz="1600" dirty="0">
+                <a:solidFill>
+                  <a:schemeClr val="bg1"/>
+                </a:solidFill>
+              </a:rPr>
+              <a:t>8 directories, 8 files</a:t>
             </a:r>
           </a:p>
         </p:txBody>
@@ -5829,7 +6192,7 @@
     </p:spTree>
     <p:extLst>
       <p:ext uri="{BB962C8B-B14F-4D97-AF65-F5344CB8AC3E}">
-        <p14:creationId xmlns:p14="http://schemas.microsoft.com/office/powerpoint/2010/main" val="3294238171"/>
+        <p14:creationId xmlns:p14="http://schemas.microsoft.com/office/powerpoint/2010/main" val="3890070987"/>
       </p:ext>
     </p:extLst>
   </p:cSld>
@@ -5872,22 +6235,544 @@
             <p:ph type="title"/>
           </p:nvPr>
         </p:nvSpPr>
-        <p:spPr/>
+        <p:spPr>
+          <a:xfrm>
+            <a:off x="3056238" y="97108"/>
+            <a:ext cx="8610600" cy="1293028"/>
+          </a:xfrm>
+        </p:spPr>
         <p:txBody>
           <a:bodyPr/>
           <a:lstStyle/>
           <a:p>
             <a:r>
               <a:rPr lang="en-US" dirty="0"/>
-              <a:t>Publishing an Ansible ROLE</a:t>
-            </a:r>
-          </a:p>
-        </p:txBody>
-      </p:sp>
+              <a:t>Ansible ROLE Structure</a:t>
+            </a:r>
+          </a:p>
+        </p:txBody>
+      </p:sp>
+      <p:graphicFrame>
+        <p:nvGraphicFramePr>
+          <p:cNvPr id="4" name="Table 4">
+            <a:extLst>
+              <a:ext uri="{FF2B5EF4-FFF2-40B4-BE49-F238E27FC236}">
+                <a16:creationId xmlns:a16="http://schemas.microsoft.com/office/drawing/2014/main" id="{41862975-C25E-7648-82B4-ACF90CC80C5E}"/>
+              </a:ext>
+            </a:extLst>
+          </p:cNvPr>
+          <p:cNvGraphicFramePr>
+            <a:graphicFrameLocks noGrp="1"/>
+          </p:cNvGraphicFramePr>
+          <p:nvPr>
+            <p:extLst>
+              <p:ext uri="{D42A27DB-BD31-4B8C-83A1-F6EECF244321}">
+                <p14:modId xmlns:p14="http://schemas.microsoft.com/office/powerpoint/2010/main" val="1420201927"/>
+              </p:ext>
+            </p:extLst>
+          </p:nvPr>
+        </p:nvGraphicFramePr>
+        <p:xfrm>
+          <a:off x="1386016" y="1390136"/>
+          <a:ext cx="10280822" cy="5213324"/>
+        </p:xfrm>
+        <a:graphic>
+          <a:graphicData uri="http://schemas.openxmlformats.org/drawingml/2006/table">
+            <a:tbl>
+              <a:tblPr firstRow="1" bandRow="1">
+                <a:tableStyleId>{21E4AEA4-8DFA-4A89-87EB-49C32662AFE0}</a:tableStyleId>
+              </a:tblPr>
+              <a:tblGrid>
+                <a:gridCol w="2337499">
+                  <a:extLst>
+                    <a:ext uri="{9D8B030D-6E8A-4147-A177-3AD203B41FA5}">
+                      <a16:colId xmlns:a16="http://schemas.microsoft.com/office/drawing/2014/main" val="569682321"/>
+                    </a:ext>
+                  </a:extLst>
+                </a:gridCol>
+                <a:gridCol w="7943323">
+                  <a:extLst>
+                    <a:ext uri="{9D8B030D-6E8A-4147-A177-3AD203B41FA5}">
+                      <a16:colId xmlns:a16="http://schemas.microsoft.com/office/drawing/2014/main" val="1010236867"/>
+                    </a:ext>
+                  </a:extLst>
+                </a:gridCol>
+              </a:tblGrid>
+              <a:tr h="428368">
+                <a:tc>
+                  <a:txBody>
+                    <a:bodyPr/>
+                    <a:lstStyle/>
+                    <a:p>
+                      <a:pPr algn="ctr"/>
+                      <a:r>
+                        <a:rPr lang="en-US" dirty="0"/>
+                        <a:t>Subdirectory</a:t>
+                      </a:r>
+                    </a:p>
+                  </a:txBody>
+                  <a:tcPr/>
+                </a:tc>
+                <a:tc>
+                  <a:txBody>
+                    <a:bodyPr/>
+                    <a:lstStyle/>
+                    <a:p>
+                      <a:pPr algn="ctr"/>
+                      <a:r>
+                        <a:rPr lang="en-US" dirty="0"/>
+                        <a:t>Function of Directory</a:t>
+                      </a:r>
+                    </a:p>
+                  </a:txBody>
+                  <a:tcPr/>
+                </a:tc>
+                <a:extLst>
+                  <a:ext uri="{0D108BD9-81ED-4DB2-BD59-A6C34878D82A}">
+                    <a16:rowId xmlns:a16="http://schemas.microsoft.com/office/drawing/2014/main" val="1718321452"/>
+                  </a:ext>
+                </a:extLst>
+              </a:tr>
+              <a:tr h="755285">
+                <a:tc>
+                  <a:txBody>
+                    <a:bodyPr/>
+                    <a:lstStyle/>
+                    <a:p>
+                      <a:r>
+                        <a:rPr lang="en-US" b="1" dirty="0"/>
+                        <a:t>defaults</a:t>
+                      </a:r>
+                    </a:p>
+                  </a:txBody>
+                  <a:tcPr/>
+                </a:tc>
+                <a:tc>
+                  <a:txBody>
+                    <a:bodyPr/>
+                    <a:lstStyle/>
+                    <a:p>
+                      <a:r>
+                        <a:rPr lang="en-US" dirty="0"/>
+                        <a:t>The </a:t>
+                      </a:r>
+                      <a:r>
+                        <a:rPr lang="en-US" b="1" dirty="0" err="1"/>
+                        <a:t>main.yml</a:t>
+                      </a:r>
+                      <a:r>
+                        <a:rPr lang="en-US" b="0" dirty="0"/>
+                        <a:t> file contains default variable values that are used by the role. These have the lowest precedence and priority.</a:t>
+                      </a:r>
+                      <a:endParaRPr lang="en-US" dirty="0"/>
+                    </a:p>
+                  </a:txBody>
+                  <a:tcPr/>
+                </a:tc>
+                <a:extLst>
+                  <a:ext uri="{0D108BD9-81ED-4DB2-BD59-A6C34878D82A}">
+                    <a16:rowId xmlns:a16="http://schemas.microsoft.com/office/drawing/2014/main" val="3750250897"/>
+                  </a:ext>
+                </a:extLst>
+              </a:tr>
+              <a:tr h="428368">
+                <a:tc>
+                  <a:txBody>
+                    <a:bodyPr/>
+                    <a:lstStyle/>
+                    <a:p>
+                      <a:pPr marL="0" marR="0" lvl="0" indent="0" algn="l" defTabSz="914400" rtl="0" eaLnBrk="1" fontAlgn="auto" latinLnBrk="0" hangingPunct="1">
+                        <a:lnSpc>
+                          <a:spcPct val="100000"/>
+                        </a:lnSpc>
+                        <a:spcBef>
+                          <a:spcPts val="0"/>
+                        </a:spcBef>
+                        <a:spcAft>
+                          <a:spcPts val="0"/>
+                        </a:spcAft>
+                        <a:buClrTx/>
+                        <a:buSzTx/>
+                        <a:buFontTx/>
+                        <a:buNone/>
+                        <a:tabLst/>
+                        <a:defRPr/>
+                      </a:pPr>
+                      <a:r>
+                        <a:rPr lang="en-US" b="1" dirty="0"/>
+                        <a:t>files</a:t>
+                      </a:r>
+                    </a:p>
+                  </a:txBody>
+                  <a:tcPr/>
+                </a:tc>
+                <a:tc>
+                  <a:txBody>
+                    <a:bodyPr/>
+                    <a:lstStyle/>
+                    <a:p>
+                      <a:r>
+                        <a:rPr lang="en-US" dirty="0"/>
+                        <a:t>Contains files that are used by the tasks in the role.</a:t>
+                      </a:r>
+                    </a:p>
+                  </a:txBody>
+                  <a:tcPr/>
+                </a:tc>
+                <a:extLst>
+                  <a:ext uri="{0D108BD9-81ED-4DB2-BD59-A6C34878D82A}">
+                    <a16:rowId xmlns:a16="http://schemas.microsoft.com/office/drawing/2014/main" val="2856030408"/>
+                  </a:ext>
+                </a:extLst>
+              </a:tr>
+              <a:tr h="428368">
+                <a:tc>
+                  <a:txBody>
+                    <a:bodyPr/>
+                    <a:lstStyle/>
+                    <a:p>
+                      <a:r>
+                        <a:rPr lang="en-US" b="1" dirty="0"/>
+                        <a:t>handlers</a:t>
+                      </a:r>
+                    </a:p>
+                  </a:txBody>
+                  <a:tcPr/>
+                </a:tc>
+                <a:tc>
+                  <a:txBody>
+                    <a:bodyPr/>
+                    <a:lstStyle/>
+                    <a:p>
+                      <a:r>
+                        <a:rPr lang="en-US" dirty="0"/>
+                        <a:t>The </a:t>
+                      </a:r>
+                      <a:r>
+                        <a:rPr lang="en-US" b="1" dirty="0" err="1"/>
+                        <a:t>main.yml</a:t>
+                      </a:r>
+                      <a:r>
+                        <a:rPr lang="en-US" b="0" dirty="0"/>
+                        <a:t> file contains handlers that are executed by the role.</a:t>
+                      </a:r>
+                      <a:endParaRPr lang="en-US" dirty="0"/>
+                    </a:p>
+                  </a:txBody>
+                  <a:tcPr/>
+                </a:tc>
+                <a:extLst>
+                  <a:ext uri="{0D108BD9-81ED-4DB2-BD59-A6C34878D82A}">
+                    <a16:rowId xmlns:a16="http://schemas.microsoft.com/office/drawing/2014/main" val="1267389368"/>
+                  </a:ext>
+                </a:extLst>
+              </a:tr>
+              <a:tr h="675558">
+                <a:tc>
+                  <a:txBody>
+                    <a:bodyPr/>
+                    <a:lstStyle/>
+                    <a:p>
+                      <a:r>
+                        <a:rPr lang="en-US" b="1" dirty="0"/>
+                        <a:t>meta</a:t>
+                      </a:r>
+                    </a:p>
+                  </a:txBody>
+                  <a:tcPr/>
+                </a:tc>
+                <a:tc>
+                  <a:txBody>
+                    <a:bodyPr/>
+                    <a:lstStyle/>
+                    <a:p>
+                      <a:pPr marL="0" marR="0" lvl="0" indent="0" algn="l" defTabSz="914400" rtl="0" eaLnBrk="1" fontAlgn="auto" latinLnBrk="0" hangingPunct="1">
+                        <a:lnSpc>
+                          <a:spcPct val="100000"/>
+                        </a:lnSpc>
+                        <a:spcBef>
+                          <a:spcPts val="0"/>
+                        </a:spcBef>
+                        <a:spcAft>
+                          <a:spcPts val="0"/>
+                        </a:spcAft>
+                        <a:buClrTx/>
+                        <a:buSzTx/>
+                        <a:buFontTx/>
+                        <a:buNone/>
+                        <a:tabLst/>
+                        <a:defRPr/>
+                      </a:pPr>
+                      <a:r>
+                        <a:rPr lang="en-US" dirty="0"/>
+                        <a:t>The </a:t>
+                      </a:r>
+                      <a:r>
+                        <a:rPr lang="en-US" b="1" dirty="0" err="1"/>
+                        <a:t>main.yml</a:t>
+                      </a:r>
+                      <a:r>
+                        <a:rPr lang="en-US" b="0" dirty="0"/>
+                        <a:t> file contains information about the role. At a minimum you should modify the </a:t>
+                      </a:r>
+                      <a:r>
+                        <a:rPr lang="en-US" b="1" i="1" dirty="0"/>
+                        <a:t>author</a:t>
+                      </a:r>
+                      <a:r>
+                        <a:rPr lang="en-US" b="0" i="0" dirty="0"/>
+                        <a:t>, </a:t>
+                      </a:r>
+                      <a:r>
+                        <a:rPr lang="en-US" sz="1800" b="1" i="1" kern="1200" dirty="0">
+                          <a:solidFill>
+                            <a:schemeClr val="dk1"/>
+                          </a:solidFill>
+                          <a:effectLst/>
+                          <a:latin typeface="+mn-lt"/>
+                          <a:ea typeface="+mn-ea"/>
+                          <a:cs typeface="+mn-cs"/>
+                        </a:rPr>
+                        <a:t>license</a:t>
+                      </a:r>
+                      <a:r>
+                        <a:rPr lang="en-US" sz="1800" kern="1200" dirty="0">
+                          <a:solidFill>
+                            <a:schemeClr val="dk1"/>
+                          </a:solidFill>
+                          <a:effectLst/>
+                          <a:latin typeface="+mn-lt"/>
+                          <a:ea typeface="+mn-ea"/>
+                          <a:cs typeface="+mn-cs"/>
+                        </a:rPr>
+                        <a:t>, </a:t>
+                      </a:r>
+                      <a:r>
+                        <a:rPr lang="en-US" sz="1800" b="1" i="1" kern="1200" dirty="0">
+                          <a:solidFill>
+                            <a:schemeClr val="dk1"/>
+                          </a:solidFill>
+                          <a:effectLst/>
+                          <a:latin typeface="+mn-lt"/>
+                          <a:ea typeface="+mn-ea"/>
+                          <a:cs typeface="+mn-cs"/>
+                        </a:rPr>
+                        <a:t>platforms</a:t>
+                      </a:r>
+                      <a:r>
+                        <a:rPr lang="en-US" sz="1800" kern="1200" dirty="0">
+                          <a:solidFill>
+                            <a:schemeClr val="dk1"/>
+                          </a:solidFill>
+                          <a:effectLst/>
+                          <a:latin typeface="+mn-lt"/>
+                          <a:ea typeface="+mn-ea"/>
+                          <a:cs typeface="+mn-cs"/>
+                        </a:rPr>
+                        <a:t>, and </a:t>
+                      </a:r>
+                      <a:r>
+                        <a:rPr lang="en-US" sz="1800" b="1" i="1" kern="1200" dirty="0">
+                          <a:solidFill>
+                            <a:schemeClr val="dk1"/>
+                          </a:solidFill>
+                          <a:effectLst/>
+                          <a:latin typeface="+mn-lt"/>
+                          <a:ea typeface="+mn-ea"/>
+                          <a:cs typeface="+mn-cs"/>
+                        </a:rPr>
+                        <a:t>dependencies</a:t>
+                      </a:r>
+                      <a:r>
+                        <a:rPr lang="en-US" sz="1800" kern="1200" dirty="0">
+                          <a:solidFill>
+                            <a:schemeClr val="dk1"/>
+                          </a:solidFill>
+                          <a:effectLst/>
+                          <a:latin typeface="+mn-lt"/>
+                          <a:ea typeface="+mn-ea"/>
+                          <a:cs typeface="+mn-cs"/>
+                        </a:rPr>
+                        <a:t>.</a:t>
+                      </a:r>
+                      <a:endParaRPr lang="en-US" dirty="0"/>
+                    </a:p>
+                  </a:txBody>
+                  <a:tcPr/>
+                </a:tc>
+                <a:extLst>
+                  <a:ext uri="{0D108BD9-81ED-4DB2-BD59-A6C34878D82A}">
+                    <a16:rowId xmlns:a16="http://schemas.microsoft.com/office/drawing/2014/main" val="140296637"/>
+                  </a:ext>
+                </a:extLst>
+              </a:tr>
+              <a:tr h="428368">
+                <a:tc>
+                  <a:txBody>
+                    <a:bodyPr/>
+                    <a:lstStyle/>
+                    <a:p>
+                      <a:r>
+                        <a:rPr lang="en-US" b="1" dirty="0"/>
+                        <a:t>tasks</a:t>
+                      </a:r>
+                    </a:p>
+                  </a:txBody>
+                  <a:tcPr/>
+                </a:tc>
+                <a:tc>
+                  <a:txBody>
+                    <a:bodyPr/>
+                    <a:lstStyle/>
+                    <a:p>
+                      <a:r>
+                        <a:rPr lang="en-US" dirty="0"/>
+                        <a:t>The </a:t>
+                      </a:r>
+                      <a:r>
+                        <a:rPr lang="en-US" b="1" dirty="0" err="1"/>
+                        <a:t>main.yml</a:t>
+                      </a:r>
+                      <a:r>
+                        <a:rPr lang="en-US" b="0" dirty="0"/>
+                        <a:t> file contains the tasks being used by the Role.</a:t>
+                      </a:r>
+                      <a:endParaRPr lang="en-US" dirty="0"/>
+                    </a:p>
+                  </a:txBody>
+                  <a:tcPr/>
+                </a:tc>
+                <a:extLst>
+                  <a:ext uri="{0D108BD9-81ED-4DB2-BD59-A6C34878D82A}">
+                    <a16:rowId xmlns:a16="http://schemas.microsoft.com/office/drawing/2014/main" val="292890363"/>
+                  </a:ext>
+                </a:extLst>
+              </a:tr>
+              <a:tr h="428368">
+                <a:tc>
+                  <a:txBody>
+                    <a:bodyPr/>
+                    <a:lstStyle/>
+                    <a:p>
+                      <a:r>
+                        <a:rPr lang="en-US" b="1" dirty="0"/>
+                        <a:t>templates</a:t>
+                      </a:r>
+                    </a:p>
+                  </a:txBody>
+                  <a:tcPr/>
+                </a:tc>
+                <a:tc>
+                  <a:txBody>
+                    <a:bodyPr/>
+                    <a:lstStyle/>
+                    <a:p>
+                      <a:r>
+                        <a:rPr lang="en-US" dirty="0"/>
+                        <a:t>Contains Jinja2 templates used by tasks in the role.</a:t>
+                      </a:r>
+                    </a:p>
+                  </a:txBody>
+                  <a:tcPr/>
+                </a:tc>
+                <a:extLst>
+                  <a:ext uri="{0D108BD9-81ED-4DB2-BD59-A6C34878D82A}">
+                    <a16:rowId xmlns:a16="http://schemas.microsoft.com/office/drawing/2014/main" val="1350362824"/>
+                  </a:ext>
+                </a:extLst>
+              </a:tr>
+              <a:tr h="675558">
+                <a:tc>
+                  <a:txBody>
+                    <a:bodyPr/>
+                    <a:lstStyle/>
+                    <a:p>
+                      <a:r>
+                        <a:rPr lang="en-US" b="1" dirty="0"/>
+                        <a:t>tests</a:t>
+                      </a:r>
+                    </a:p>
+                  </a:txBody>
+                  <a:tcPr/>
+                </a:tc>
+                <a:tc>
+                  <a:txBody>
+                    <a:bodyPr/>
+                    <a:lstStyle/>
+                    <a:p>
+                      <a:r>
+                        <a:rPr lang="en-US" dirty="0"/>
+                        <a:t>Contains an inventory and </a:t>
+                      </a:r>
+                      <a:r>
+                        <a:rPr lang="en-US" b="1" dirty="0" err="1"/>
+                        <a:t>test.yml</a:t>
+                      </a:r>
+                      <a:r>
+                        <a:rPr lang="en-US" b="0" dirty="0"/>
+                        <a:t> playbook that can be used to test the role.</a:t>
+                      </a:r>
+                      <a:endParaRPr lang="en-US" dirty="0"/>
+                    </a:p>
+                  </a:txBody>
+                  <a:tcPr/>
+                </a:tc>
+                <a:extLst>
+                  <a:ext uri="{0D108BD9-81ED-4DB2-BD59-A6C34878D82A}">
+                    <a16:rowId xmlns:a16="http://schemas.microsoft.com/office/drawing/2014/main" val="1892245842"/>
+                  </a:ext>
+                </a:extLst>
+              </a:tr>
+              <a:tr h="965083">
+                <a:tc>
+                  <a:txBody>
+                    <a:bodyPr/>
+                    <a:lstStyle/>
+                    <a:p>
+                      <a:r>
+                        <a:rPr lang="en-US" b="1" dirty="0"/>
+                        <a:t>vars</a:t>
+                      </a:r>
+                    </a:p>
+                  </a:txBody>
+                  <a:tcPr/>
+                </a:tc>
+                <a:tc>
+                  <a:txBody>
+                    <a:bodyPr/>
+                    <a:lstStyle/>
+                    <a:p>
+                      <a:r>
+                        <a:rPr lang="en-US" dirty="0"/>
+                        <a:t>The </a:t>
+                      </a:r>
+                      <a:r>
+                        <a:rPr lang="en-US" b="1" dirty="0" err="1"/>
+                        <a:t>main.yml</a:t>
+                      </a:r>
+                      <a:r>
+                        <a:rPr lang="en-US" b="0" dirty="0"/>
+                        <a:t> file contains role variables and values. These are high precedence and not intended to be changed when used in a playbook.</a:t>
+                      </a:r>
+                      <a:endParaRPr lang="en-US" dirty="0"/>
+                    </a:p>
+                  </a:txBody>
+                  <a:tcPr/>
+                </a:tc>
+                <a:extLst>
+                  <a:ext uri="{0D108BD9-81ED-4DB2-BD59-A6C34878D82A}">
+                    <a16:rowId xmlns:a16="http://schemas.microsoft.com/office/drawing/2014/main" val="1357933882"/>
+                  </a:ext>
+                </a:extLst>
+              </a:tr>
+            </a:tbl>
+          </a:graphicData>
+        </a:graphic>
+      </p:graphicFrame>
     </p:spTree>
     <p:extLst>
       <p:ext uri="{BB962C8B-B14F-4D97-AF65-F5344CB8AC3E}">
-        <p14:creationId xmlns:p14="http://schemas.microsoft.com/office/powerpoint/2010/main" val="4239218780"/>
+        <p14:creationId xmlns:p14="http://schemas.microsoft.com/office/powerpoint/2010/main" val="590233725"/>
       </p:ext>
     </p:extLst>
   </p:cSld>
@@ -5955,7 +6840,7 @@
             </a:br>
             <a:r>
               <a:rPr lang="en-US" dirty="0"/>
-              <a:t>Publishing an Ansible ROLE</a:t>
+              <a:t>Creating an Ansible ROLE</a:t>
             </a:r>
           </a:p>
         </p:txBody>
@@ -5963,7 +6848,7 @@
     </p:spTree>
     <p:extLst>
       <p:ext uri="{BB962C8B-B14F-4D97-AF65-F5344CB8AC3E}">
-        <p14:creationId xmlns:p14="http://schemas.microsoft.com/office/powerpoint/2010/main" val="4276166831"/>
+        <p14:creationId xmlns:p14="http://schemas.microsoft.com/office/powerpoint/2010/main" val="3294238171"/>
       </p:ext>
     </p:extLst>
   </p:cSld>
@@ -6006,6 +6891,348 @@
             <p:ph type="title"/>
           </p:nvPr>
         </p:nvSpPr>
+        <p:spPr>
+          <a:xfrm>
+            <a:off x="3377514" y="529595"/>
+            <a:ext cx="8610600" cy="1293028"/>
+          </a:xfrm>
+        </p:spPr>
+        <p:txBody>
+          <a:bodyPr>
+            <a:normAutofit/>
+          </a:bodyPr>
+          <a:lstStyle/>
+          <a:p>
+            <a:r>
+              <a:rPr lang="en-US" sz="4400" dirty="0"/>
+              <a:t>Publishing an Ansible ROLE</a:t>
+            </a:r>
+          </a:p>
+        </p:txBody>
+      </p:sp>
+      <p:sp>
+        <p:nvSpPr>
+          <p:cNvPr id="3" name="TextBox 2">
+            <a:extLst>
+              <a:ext uri="{FF2B5EF4-FFF2-40B4-BE49-F238E27FC236}">
+                <a16:creationId xmlns:a16="http://schemas.microsoft.com/office/drawing/2014/main" id="{2D59D8B0-68B3-0046-BB9C-5C3B882DE4AC}"/>
+              </a:ext>
+            </a:extLst>
+          </p:cNvPr>
+          <p:cNvSpPr txBox="1"/>
+          <p:nvPr/>
+        </p:nvSpPr>
+        <p:spPr>
+          <a:xfrm>
+            <a:off x="806278" y="3163330"/>
+            <a:ext cx="10579443" cy="2585323"/>
+          </a:xfrm>
+          <a:prstGeom prst="rect">
+            <a:avLst/>
+          </a:prstGeom>
+          <a:noFill/>
+        </p:spPr>
+        <p:txBody>
+          <a:bodyPr wrap="square" rtlCol="0">
+            <a:spAutoFit/>
+          </a:bodyPr>
+          <a:lstStyle/>
+          <a:p>
+            <a:pPr marL="285750" indent="-285750">
+              <a:buFont typeface="Arial" panose="020B0604020202020204" pitchFamily="34" charset="0"/>
+              <a:buChar char="•"/>
+            </a:pPr>
+            <a:r>
+              <a:rPr lang="en-US" b="1" dirty="0" err="1">
+                <a:solidFill>
+                  <a:schemeClr val="accent2"/>
+                </a:solidFill>
+              </a:rPr>
+              <a:t>Github</a:t>
+            </a:r>
+            <a:r>
+              <a:rPr lang="en-US" b="1" dirty="0">
+                <a:solidFill>
+                  <a:schemeClr val="accent2"/>
+                </a:solidFill>
+              </a:rPr>
+              <a:t> Repository</a:t>
+            </a:r>
+            <a:r>
+              <a:rPr lang="en-US" dirty="0">
+                <a:solidFill>
+                  <a:schemeClr val="accent2"/>
+                </a:solidFill>
+              </a:rPr>
+              <a:t> </a:t>
+            </a:r>
+            <a:r>
+              <a:rPr lang="en-US" dirty="0"/>
+              <a:t>– Repository created for housing just the Ansible role. If you are publishing more than a single role, you should have a repository for each role. </a:t>
+            </a:r>
+          </a:p>
+          <a:p>
+            <a:pPr marL="285750" indent="-285750">
+              <a:buFont typeface="Arial" panose="020B0604020202020204" pitchFamily="34" charset="0"/>
+              <a:buChar char="•"/>
+            </a:pPr>
+            <a:endParaRPr lang="en-US" dirty="0"/>
+          </a:p>
+          <a:p>
+            <a:pPr marL="285750" indent="-285750">
+              <a:buFont typeface="Arial" panose="020B0604020202020204" pitchFamily="34" charset="0"/>
+              <a:buChar char="•"/>
+            </a:pPr>
+            <a:r>
+              <a:rPr lang="en-US" b="1" dirty="0">
+                <a:solidFill>
+                  <a:schemeClr val="accent2"/>
+                </a:solidFill>
+              </a:rPr>
+              <a:t>Ansible Galaxy Account</a:t>
+            </a:r>
+            <a:r>
+              <a:rPr lang="en-US" dirty="0"/>
+              <a:t> – This account is required to be created and linked to your </a:t>
+            </a:r>
+            <a:r>
+              <a:rPr lang="en-US" dirty="0" err="1"/>
+              <a:t>Github</a:t>
+            </a:r>
+            <a:r>
+              <a:rPr lang="en-US" dirty="0"/>
+              <a:t> account. Once this is completed, you can select repositories to import to Ansible Galaxy as Ansible Roles.</a:t>
+            </a:r>
+          </a:p>
+          <a:p>
+            <a:pPr marL="285750" indent="-285750">
+              <a:buFont typeface="Arial" panose="020B0604020202020204" pitchFamily="34" charset="0"/>
+              <a:buChar char="•"/>
+            </a:pPr>
+            <a:endParaRPr lang="en-US" dirty="0"/>
+          </a:p>
+          <a:p>
+            <a:pPr marL="285750" indent="-285750">
+              <a:buFont typeface="Arial" panose="020B0604020202020204" pitchFamily="34" charset="0"/>
+              <a:buChar char="•"/>
+            </a:pPr>
+            <a:r>
+              <a:rPr lang="en-US" b="1" dirty="0">
+                <a:solidFill>
+                  <a:schemeClr val="accent2"/>
+                </a:solidFill>
+              </a:rPr>
+              <a:t>Role</a:t>
+            </a:r>
+            <a:r>
+              <a:rPr lang="en-US" dirty="0"/>
+              <a:t> – A properly formatted role. Ideally one that was created and initialized with the </a:t>
+            </a:r>
+            <a:r>
+              <a:rPr lang="en-US" b="1" dirty="0"/>
+              <a:t>ansible-galaxy </a:t>
+            </a:r>
+            <a:r>
+              <a:rPr lang="en-US" b="1" dirty="0" err="1"/>
+              <a:t>init</a:t>
+            </a:r>
+            <a:r>
+              <a:rPr lang="en-US" b="1" dirty="0"/>
+              <a:t> &lt;</a:t>
+            </a:r>
+            <a:r>
+              <a:rPr lang="en-US" b="1" dirty="0" err="1"/>
+              <a:t>RoleName</a:t>
+            </a:r>
+            <a:r>
+              <a:rPr lang="en-US" b="1" dirty="0"/>
+              <a:t>&gt;</a:t>
+            </a:r>
+            <a:r>
+              <a:rPr lang="en-US" dirty="0"/>
+              <a:t> command.</a:t>
+            </a:r>
+            <a:endParaRPr lang="en-US" b="1" dirty="0"/>
+          </a:p>
+        </p:txBody>
+      </p:sp>
+      <p:sp>
+        <p:nvSpPr>
+          <p:cNvPr id="4" name="Title 1">
+            <a:extLst>
+              <a:ext uri="{FF2B5EF4-FFF2-40B4-BE49-F238E27FC236}">
+                <a16:creationId xmlns:a16="http://schemas.microsoft.com/office/drawing/2014/main" id="{6FC7F12C-0CFD-0345-8491-0FC215D540B5}"/>
+              </a:ext>
+            </a:extLst>
+          </p:cNvPr>
+          <p:cNvSpPr txBox="1">
+            <a:spLocks/>
+          </p:cNvSpPr>
+          <p:nvPr/>
+        </p:nvSpPr>
+        <p:spPr>
+          <a:xfrm>
+            <a:off x="914401" y="2310713"/>
+            <a:ext cx="10471320" cy="804937"/>
+          </a:xfrm>
+          <a:prstGeom prst="rect">
+            <a:avLst/>
+          </a:prstGeom>
+        </p:spPr>
+        <p:txBody>
+          <a:bodyPr vert="horz" lIns="91440" tIns="45720" rIns="91440" bIns="45720" rtlCol="0" anchor="ctr">
+            <a:normAutofit/>
+          </a:bodyPr>
+          <a:lstStyle>
+            <a:lvl1pPr algn="r" defTabSz="914400" rtl="0" eaLnBrk="1" latinLnBrk="0" hangingPunct="1">
+              <a:lnSpc>
+                <a:spcPct val="90000"/>
+              </a:lnSpc>
+              <a:spcBef>
+                <a:spcPct val="0"/>
+              </a:spcBef>
+              <a:buNone/>
+              <a:defRPr sz="4000" kern="1200" cap="all" baseline="0">
+                <a:solidFill>
+                  <a:schemeClr val="tx1"/>
+                </a:solidFill>
+                <a:latin typeface="+mj-lt"/>
+                <a:ea typeface="+mj-ea"/>
+                <a:cs typeface="+mj-cs"/>
+              </a:defRPr>
+            </a:lvl1pPr>
+          </a:lstStyle>
+          <a:p>
+            <a:pPr algn="ctr"/>
+            <a:r>
+              <a:rPr lang="en-US" sz="2800" b="1" dirty="0"/>
+              <a:t>Requirements</a:t>
+            </a:r>
+          </a:p>
+        </p:txBody>
+      </p:sp>
+    </p:spTree>
+    <p:extLst>
+      <p:ext uri="{BB962C8B-B14F-4D97-AF65-F5344CB8AC3E}">
+        <p14:creationId xmlns:p14="http://schemas.microsoft.com/office/powerpoint/2010/main" val="4239218780"/>
+      </p:ext>
+    </p:extLst>
+  </p:cSld>
+  <p:clrMapOvr>
+    <a:masterClrMapping/>
+  </p:clrMapOvr>
+</p:sld>
+</file>
+
+<file path=ppt/slides/slide14.xml><?xml version="1.0" encoding="utf-8"?>
+<p:sld xmlns:a="http://schemas.openxmlformats.org/drawingml/2006/main" xmlns:r="http://schemas.openxmlformats.org/officeDocument/2006/relationships" xmlns:p="http://schemas.openxmlformats.org/presentationml/2006/main">
+  <p:cSld>
+    <p:spTree>
+      <p:nvGrpSpPr>
+        <p:cNvPr id="1" name=""/>
+        <p:cNvGrpSpPr/>
+        <p:nvPr/>
+      </p:nvGrpSpPr>
+      <p:grpSpPr>
+        <a:xfrm>
+          <a:off x="0" y="0"/>
+          <a:ext cx="0" cy="0"/>
+          <a:chOff x="0" y="0"/>
+          <a:chExt cx="0" cy="0"/>
+        </a:xfrm>
+      </p:grpSpPr>
+      <p:sp>
+        <p:nvSpPr>
+          <p:cNvPr id="2" name="Title 1">
+            <a:extLst>
+              <a:ext uri="{FF2B5EF4-FFF2-40B4-BE49-F238E27FC236}">
+                <a16:creationId xmlns:a16="http://schemas.microsoft.com/office/drawing/2014/main" id="{6CABA702-67A0-5A41-825C-2729E00E8A73}"/>
+              </a:ext>
+            </a:extLst>
+          </p:cNvPr>
+          <p:cNvSpPr>
+            <a:spLocks noGrp="1"/>
+          </p:cNvSpPr>
+          <p:nvPr>
+            <p:ph type="title"/>
+          </p:nvPr>
+        </p:nvSpPr>
+        <p:spPr>
+          <a:xfrm>
+            <a:off x="1384852" y="2960921"/>
+            <a:ext cx="8610600" cy="1293028"/>
+          </a:xfrm>
+        </p:spPr>
+        <p:txBody>
+          <a:bodyPr>
+            <a:normAutofit fontScale="90000"/>
+          </a:bodyPr>
+          <a:lstStyle/>
+          <a:p>
+            <a:pPr algn="ctr"/>
+            <a:r>
+              <a:rPr lang="en-US" dirty="0"/>
+              <a:t>DEMO</a:t>
+            </a:r>
+            <a:br>
+              <a:rPr lang="en-US" dirty="0"/>
+            </a:br>
+            <a:br>
+              <a:rPr lang="en-US" dirty="0"/>
+            </a:br>
+            <a:r>
+              <a:rPr lang="en-US" dirty="0"/>
+              <a:t>Publishing an Ansible ROLE</a:t>
+            </a:r>
+          </a:p>
+        </p:txBody>
+      </p:sp>
+    </p:spTree>
+    <p:extLst>
+      <p:ext uri="{BB962C8B-B14F-4D97-AF65-F5344CB8AC3E}">
+        <p14:creationId xmlns:p14="http://schemas.microsoft.com/office/powerpoint/2010/main" val="4276166831"/>
+      </p:ext>
+    </p:extLst>
+  </p:cSld>
+  <p:clrMapOvr>
+    <a:masterClrMapping/>
+  </p:clrMapOvr>
+</p:sld>
+</file>
+
+<file path=ppt/slides/slide15.xml><?xml version="1.0" encoding="utf-8"?>
+<p:sld xmlns:a="http://schemas.openxmlformats.org/drawingml/2006/main" xmlns:r="http://schemas.openxmlformats.org/officeDocument/2006/relationships" xmlns:p="http://schemas.openxmlformats.org/presentationml/2006/main">
+  <p:cSld>
+    <p:spTree>
+      <p:nvGrpSpPr>
+        <p:cNvPr id="1" name=""/>
+        <p:cNvGrpSpPr/>
+        <p:nvPr/>
+      </p:nvGrpSpPr>
+      <p:grpSpPr>
+        <a:xfrm>
+          <a:off x="0" y="0"/>
+          <a:ext cx="0" cy="0"/>
+          <a:chOff x="0" y="0"/>
+          <a:chExt cx="0" cy="0"/>
+        </a:xfrm>
+      </p:grpSpPr>
+      <p:sp>
+        <p:nvSpPr>
+          <p:cNvPr id="2" name="Title 1">
+            <a:extLst>
+              <a:ext uri="{FF2B5EF4-FFF2-40B4-BE49-F238E27FC236}">
+                <a16:creationId xmlns:a16="http://schemas.microsoft.com/office/drawing/2014/main" id="{6CABA702-67A0-5A41-825C-2729E00E8A73}"/>
+              </a:ext>
+            </a:extLst>
+          </p:cNvPr>
+          <p:cNvSpPr>
+            <a:spLocks noGrp="1"/>
+          </p:cNvSpPr>
+          <p:nvPr>
+            <p:ph type="title"/>
+          </p:nvPr>
+        </p:nvSpPr>
         <p:spPr/>
         <p:txBody>
           <a:bodyPr/>
@@ -6020,6 +7247,283 @@
               <a:t>OpenSCAP</a:t>
             </a:r>
             <a:endParaRPr lang="en-US" dirty="0"/>
+          </a:p>
+        </p:txBody>
+      </p:sp>
+      <p:sp>
+        <p:nvSpPr>
+          <p:cNvPr id="3" name="Rectangle 2">
+            <a:extLst>
+              <a:ext uri="{FF2B5EF4-FFF2-40B4-BE49-F238E27FC236}">
+                <a16:creationId xmlns:a16="http://schemas.microsoft.com/office/drawing/2014/main" id="{73628AAA-05CB-3740-95ED-62AA14063515}"/>
+              </a:ext>
+            </a:extLst>
+          </p:cNvPr>
+          <p:cNvSpPr/>
+          <p:nvPr/>
+        </p:nvSpPr>
+        <p:spPr>
+          <a:xfrm>
+            <a:off x="632253" y="2400308"/>
+            <a:ext cx="11106665" cy="3970318"/>
+          </a:xfrm>
+          <a:prstGeom prst="rect">
+            <a:avLst/>
+          </a:prstGeom>
+        </p:spPr>
+        <p:txBody>
+          <a:bodyPr wrap="square">
+            <a:spAutoFit/>
+          </a:bodyPr>
+          <a:lstStyle/>
+          <a:p>
+            <a:pPr marL="285750" indent="-285750">
+              <a:buFont typeface="Arial" panose="020B0604020202020204" pitchFamily="34" charset="0"/>
+              <a:buChar char="•"/>
+            </a:pPr>
+            <a:r>
+              <a:rPr lang="en-US" b="1" dirty="0">
+                <a:solidFill>
+                  <a:schemeClr val="accent2"/>
+                </a:solidFill>
+                <a:latin typeface="Trebuchet MS" panose="020B0703020202090204" pitchFamily="34" charset="0"/>
+              </a:rPr>
+              <a:t>SCAP:</a:t>
+            </a:r>
+            <a:r>
+              <a:rPr lang="en-US" dirty="0">
+                <a:solidFill>
+                  <a:srgbClr val="FFFFFF"/>
+                </a:solidFill>
+                <a:latin typeface="Trebuchet MS" panose="020B0703020202090204" pitchFamily="34" charset="0"/>
+              </a:rPr>
+              <a:t> The Security Content Automation Protocol (SCAP) is a method for using specific standards to enable the automated vulnerability management, measurement, and policy compliance evaluation of systems deployed in an organization, including e.g., FISMA compliance. The National Vulnerability Database (NVD) is the U.S. government content repository for SCAP. An example of an implementation of SCAP is </a:t>
+            </a:r>
+            <a:r>
+              <a:rPr lang="en-US" dirty="0" err="1">
+                <a:solidFill>
+                  <a:srgbClr val="FFFFFF"/>
+                </a:solidFill>
+                <a:latin typeface="Trebuchet MS" panose="020B0703020202090204" pitchFamily="34" charset="0"/>
+              </a:rPr>
+              <a:t>OpenSCAP</a:t>
+            </a:r>
+            <a:endParaRPr lang="en-US" dirty="0">
+              <a:solidFill>
+                <a:srgbClr val="FFFFFF"/>
+              </a:solidFill>
+              <a:latin typeface="Trebuchet MS" panose="020B0703020202090204" pitchFamily="34" charset="0"/>
+            </a:endParaRPr>
+          </a:p>
+          <a:p>
+            <a:pPr marL="742950" lvl="1" indent="-285750">
+              <a:buFont typeface="Arial" panose="020B0604020202020204" pitchFamily="34" charset="0"/>
+              <a:buChar char="•"/>
+            </a:pPr>
+            <a:r>
+              <a:rPr lang="en-US" b="1" dirty="0">
+                <a:solidFill>
+                  <a:srgbClr val="FFFFFF"/>
+                </a:solidFill>
+                <a:latin typeface="Trebuchet MS" panose="020B0703020202090204" pitchFamily="34" charset="0"/>
+                <a:hlinkClick r:id="rId2"/>
+              </a:rPr>
+              <a:t>https://csrc.nist.gov/projects/security-content-automation-protocol</a:t>
+            </a:r>
+            <a:r>
+              <a:rPr lang="en-US" b="1" dirty="0">
+                <a:solidFill>
+                  <a:srgbClr val="FFFFFF"/>
+                </a:solidFill>
+                <a:latin typeface="Trebuchet MS" panose="020B0703020202090204" pitchFamily="34" charset="0"/>
+              </a:rPr>
+              <a:t> </a:t>
+            </a:r>
+            <a:endParaRPr lang="en-US" dirty="0">
+              <a:solidFill>
+                <a:srgbClr val="FFFFFF"/>
+              </a:solidFill>
+              <a:latin typeface="Trebuchet MS" panose="020B0703020202090204" pitchFamily="34" charset="0"/>
+            </a:endParaRPr>
+          </a:p>
+          <a:p>
+            <a:br>
+              <a:rPr lang="en-US" dirty="0">
+                <a:solidFill>
+                  <a:srgbClr val="FFFFFF"/>
+                </a:solidFill>
+                <a:latin typeface="Helvetica" pitchFamily="2" charset="0"/>
+              </a:rPr>
+            </a:br>
+            <a:endParaRPr lang="en-US" dirty="0">
+              <a:solidFill>
+                <a:srgbClr val="FFFFFF"/>
+              </a:solidFill>
+              <a:latin typeface="Helvetica" pitchFamily="2" charset="0"/>
+            </a:endParaRPr>
+          </a:p>
+          <a:p>
+            <a:pPr marL="285750" indent="-285750">
+              <a:buFont typeface="Arial" panose="020B0604020202020204" pitchFamily="34" charset="0"/>
+              <a:buChar char="•"/>
+            </a:pPr>
+            <a:r>
+              <a:rPr lang="en-US" b="1" dirty="0" err="1">
+                <a:solidFill>
+                  <a:schemeClr val="accent2"/>
+                </a:solidFill>
+                <a:latin typeface="Trebuchet MS" panose="020B0703020202090204" pitchFamily="34" charset="0"/>
+              </a:rPr>
+              <a:t>OpenSCAP</a:t>
+            </a:r>
+            <a:r>
+              <a:rPr lang="en-US" b="1" dirty="0">
+                <a:solidFill>
+                  <a:schemeClr val="accent2"/>
+                </a:solidFill>
+                <a:latin typeface="Trebuchet MS" panose="020B0703020202090204" pitchFamily="34" charset="0"/>
+              </a:rPr>
+              <a:t>:</a:t>
+            </a:r>
+            <a:r>
+              <a:rPr lang="en-US" dirty="0">
+                <a:solidFill>
+                  <a:srgbClr val="FFFFFF"/>
+                </a:solidFill>
+                <a:latin typeface="Trebuchet MS" panose="020B0703020202090204" pitchFamily="34" charset="0"/>
+              </a:rPr>
+              <a:t>  An auditing tool that utilizes the Extensible Configuration Checklist Description Format (XCCDF). XCCDF is a standard way of expressing checklist content and defines security checklists</a:t>
+            </a:r>
+          </a:p>
+          <a:p>
+            <a:pPr marL="742950" lvl="1" indent="-285750">
+              <a:buFont typeface="Arial" panose="020B0604020202020204" pitchFamily="34" charset="0"/>
+              <a:buChar char="•"/>
+            </a:pPr>
+            <a:r>
+              <a:rPr lang="en-US" b="1" dirty="0">
+                <a:solidFill>
+                  <a:srgbClr val="FFFFFF"/>
+                </a:solidFill>
+                <a:latin typeface="Trebuchet MS" panose="020B0703020202090204" pitchFamily="34" charset="0"/>
+                <a:hlinkClick r:id="rId3"/>
+              </a:rPr>
+              <a:t>https://www.open-scap.org/</a:t>
+            </a:r>
+            <a:endParaRPr lang="en-US" b="1" dirty="0">
+              <a:solidFill>
+                <a:srgbClr val="FFFFFF"/>
+              </a:solidFill>
+              <a:latin typeface="Trebuchet MS" panose="020B0703020202090204" pitchFamily="34" charset="0"/>
+            </a:endParaRPr>
+          </a:p>
+          <a:p>
+            <a:pPr marL="285750" indent="-285750">
+              <a:buFont typeface="Arial" panose="020B0604020202020204" pitchFamily="34" charset="0"/>
+              <a:buChar char="•"/>
+            </a:pPr>
+            <a:endParaRPr lang="en-US" b="1" dirty="0">
+              <a:solidFill>
+                <a:srgbClr val="FFFFFF"/>
+              </a:solidFill>
+              <a:effectLst/>
+              <a:latin typeface="Trebuchet MS" panose="020B0703020202090204" pitchFamily="34" charset="0"/>
+            </a:endParaRPr>
+          </a:p>
+          <a:p>
+            <a:pPr marL="285750" indent="-285750">
+              <a:buFont typeface="Arial" panose="020B0604020202020204" pitchFamily="34" charset="0"/>
+              <a:buChar char="•"/>
+            </a:pPr>
+            <a:r>
+              <a:rPr lang="en-US" b="1" dirty="0">
+                <a:solidFill>
+                  <a:schemeClr val="accent2"/>
+                </a:solidFill>
+                <a:effectLst/>
+                <a:latin typeface="Trebuchet MS" panose="020B0703020202090204" pitchFamily="34" charset="0"/>
+              </a:rPr>
+              <a:t>SCA</a:t>
+            </a:r>
+            <a:r>
+              <a:rPr lang="en-US" b="1" dirty="0">
+                <a:solidFill>
+                  <a:schemeClr val="accent2"/>
+                </a:solidFill>
+                <a:latin typeface="Trebuchet MS" panose="020B0703020202090204" pitchFamily="34" charset="0"/>
+              </a:rPr>
+              <a:t>P Workbench</a:t>
+            </a:r>
+            <a:r>
+              <a:rPr lang="en-US" b="1" dirty="0">
+                <a:solidFill>
+                  <a:srgbClr val="FFFFFF"/>
+                </a:solidFill>
+                <a:latin typeface="Trebuchet MS" panose="020B0703020202090204" pitchFamily="34" charset="0"/>
+              </a:rPr>
+              <a:t>: </a:t>
+            </a:r>
+            <a:r>
+              <a:rPr lang="en-US" dirty="0">
+                <a:solidFill>
+                  <a:srgbClr val="FFFFFF"/>
+                </a:solidFill>
+                <a:latin typeface="Trebuchet MS" panose="020B0703020202090204" pitchFamily="34" charset="0"/>
+              </a:rPr>
+              <a:t>Graphical utility that allows an easy way to interact and perform common </a:t>
+            </a:r>
+            <a:r>
+              <a:rPr lang="en-US" b="1" i="1" dirty="0" err="1">
+                <a:solidFill>
+                  <a:srgbClr val="FFFFFF"/>
+                </a:solidFill>
+                <a:latin typeface="Trebuchet MS" panose="020B0703020202090204" pitchFamily="34" charset="0"/>
+              </a:rPr>
+              <a:t>oscap</a:t>
+            </a:r>
+            <a:r>
+              <a:rPr lang="en-US" i="1" dirty="0">
+                <a:solidFill>
+                  <a:srgbClr val="FFFFFF"/>
+                </a:solidFill>
+                <a:latin typeface="Trebuchet MS" panose="020B0703020202090204" pitchFamily="34" charset="0"/>
+              </a:rPr>
+              <a:t> </a:t>
+            </a:r>
+            <a:r>
+              <a:rPr lang="en-US" dirty="0">
+                <a:solidFill>
+                  <a:srgbClr val="FFFFFF"/>
+                </a:solidFill>
+                <a:latin typeface="Trebuchet MS" panose="020B0703020202090204" pitchFamily="34" charset="0"/>
+              </a:rPr>
+              <a:t>tasks. It also provides an easy way to modify and tailor </a:t>
+            </a:r>
+            <a:r>
+              <a:rPr lang="en-US" b="1" i="1" dirty="0">
+                <a:solidFill>
+                  <a:srgbClr val="FFFFFF"/>
+                </a:solidFill>
+                <a:latin typeface="Trebuchet MS" panose="020B0703020202090204" pitchFamily="34" charset="0"/>
+              </a:rPr>
+              <a:t>XCCDF</a:t>
+            </a:r>
+            <a:r>
+              <a:rPr lang="en-US" dirty="0">
+                <a:solidFill>
+                  <a:srgbClr val="FFFFFF"/>
+                </a:solidFill>
+                <a:latin typeface="Trebuchet MS" panose="020B0703020202090204" pitchFamily="34" charset="0"/>
+              </a:rPr>
+              <a:t> profiles. </a:t>
+            </a:r>
+            <a:endParaRPr lang="en-US" dirty="0">
+              <a:solidFill>
+                <a:srgbClr val="FFFFFF"/>
+              </a:solidFill>
+              <a:effectLst/>
+              <a:latin typeface="Trebuchet MS" panose="020B0703020202090204" pitchFamily="34" charset="0"/>
+            </a:endParaRPr>
           </a:p>
         </p:txBody>
       </p:sp>
@@ -6036,7 +7540,7 @@
 </p:sld>
 </file>
 
-<file path=ppt/slides/slide14.xml><?xml version="1.0" encoding="utf-8"?>
+<file path=ppt/slides/slide16.xml><?xml version="1.0" encoding="utf-8"?>
 <p:sld xmlns:a="http://schemas.openxmlformats.org/drawingml/2006/main" xmlns:r="http://schemas.openxmlformats.org/officeDocument/2006/relationships" xmlns:p="http://schemas.openxmlformats.org/presentationml/2006/main">
   <p:cSld>
     <p:spTree>
@@ -6514,6 +8018,268 @@
           </a:p>
         </p:txBody>
       </p:sp>
+      <p:sp>
+        <p:nvSpPr>
+          <p:cNvPr id="3" name="Content Placeholder 2">
+            <a:extLst>
+              <a:ext uri="{FF2B5EF4-FFF2-40B4-BE49-F238E27FC236}">
+                <a16:creationId xmlns:a16="http://schemas.microsoft.com/office/drawing/2014/main" id="{8E43DC95-C9F8-BC47-B485-D0F62114A234}"/>
+              </a:ext>
+            </a:extLst>
+          </p:cNvPr>
+          <p:cNvSpPr txBox="1">
+            <a:spLocks/>
+          </p:cNvSpPr>
+          <p:nvPr/>
+        </p:nvSpPr>
+        <p:spPr>
+          <a:xfrm>
+            <a:off x="288235" y="2335426"/>
+            <a:ext cx="11370365" cy="4154825"/>
+          </a:xfrm>
+          <a:prstGeom prst="rect">
+            <a:avLst/>
+          </a:prstGeom>
+        </p:spPr>
+        <p:txBody>
+          <a:bodyPr>
+            <a:normAutofit/>
+          </a:bodyPr>
+          <a:lstStyle>
+            <a:lvl1pPr marL="228600" indent="-228600" algn="l" defTabSz="914400" rtl="0" eaLnBrk="1" latinLnBrk="0" hangingPunct="1">
+              <a:lnSpc>
+                <a:spcPct val="90000"/>
+              </a:lnSpc>
+              <a:spcBef>
+                <a:spcPts val="1000"/>
+              </a:spcBef>
+              <a:buFont typeface="Arial" panose="020B0604020202020204" pitchFamily="34" charset="0"/>
+              <a:buChar char="•"/>
+              <a:defRPr sz="2200" kern="1200">
+                <a:solidFill>
+                  <a:schemeClr val="tx1"/>
+                </a:solidFill>
+                <a:latin typeface="+mn-lt"/>
+                <a:ea typeface="+mn-ea"/>
+                <a:cs typeface="+mn-cs"/>
+              </a:defRPr>
+            </a:lvl1pPr>
+            <a:lvl2pPr marL="685800" indent="-228600" algn="l" defTabSz="914400" rtl="0" eaLnBrk="1" latinLnBrk="0" hangingPunct="1">
+              <a:lnSpc>
+                <a:spcPct val="90000"/>
+              </a:lnSpc>
+              <a:spcBef>
+                <a:spcPts val="500"/>
+              </a:spcBef>
+              <a:buFont typeface="Arial" panose="020B0604020202020204" pitchFamily="34" charset="0"/>
+              <a:buChar char="•"/>
+              <a:defRPr sz="2000" kern="1200">
+                <a:solidFill>
+                  <a:schemeClr val="tx1"/>
+                </a:solidFill>
+                <a:latin typeface="+mn-lt"/>
+                <a:ea typeface="+mn-ea"/>
+                <a:cs typeface="+mn-cs"/>
+              </a:defRPr>
+            </a:lvl2pPr>
+            <a:lvl3pPr marL="1143000" indent="-228600" algn="l" defTabSz="914400" rtl="0" eaLnBrk="1" latinLnBrk="0" hangingPunct="1">
+              <a:lnSpc>
+                <a:spcPct val="90000"/>
+              </a:lnSpc>
+              <a:spcBef>
+                <a:spcPts val="500"/>
+              </a:spcBef>
+              <a:buFont typeface="Arial" panose="020B0604020202020204" pitchFamily="34" charset="0"/>
+              <a:buChar char="•"/>
+              <a:defRPr sz="1800" kern="1200">
+                <a:solidFill>
+                  <a:schemeClr val="tx1"/>
+                </a:solidFill>
+                <a:latin typeface="+mn-lt"/>
+                <a:ea typeface="+mn-ea"/>
+                <a:cs typeface="+mn-cs"/>
+              </a:defRPr>
+            </a:lvl3pPr>
+            <a:lvl4pPr marL="1600200" indent="-228600" algn="l" defTabSz="914400" rtl="0" eaLnBrk="1" latinLnBrk="0" hangingPunct="1">
+              <a:lnSpc>
+                <a:spcPct val="90000"/>
+              </a:lnSpc>
+              <a:spcBef>
+                <a:spcPts val="500"/>
+              </a:spcBef>
+              <a:buFont typeface="Arial" panose="020B0604020202020204" pitchFamily="34" charset="0"/>
+              <a:buChar char="•"/>
+              <a:defRPr sz="1600" kern="1200">
+                <a:solidFill>
+                  <a:schemeClr val="tx1"/>
+                </a:solidFill>
+                <a:latin typeface="+mn-lt"/>
+                <a:ea typeface="+mn-ea"/>
+                <a:cs typeface="+mn-cs"/>
+              </a:defRPr>
+            </a:lvl4pPr>
+            <a:lvl5pPr marL="2057400" indent="-228600" algn="l" defTabSz="914400" rtl="0" eaLnBrk="1" latinLnBrk="0" hangingPunct="1">
+              <a:lnSpc>
+                <a:spcPct val="90000"/>
+              </a:lnSpc>
+              <a:spcBef>
+                <a:spcPts val="500"/>
+              </a:spcBef>
+              <a:buFont typeface="Arial" panose="020B0604020202020204" pitchFamily="34" charset="0"/>
+              <a:buChar char="•"/>
+              <a:defRPr sz="1600" kern="1200">
+                <a:solidFill>
+                  <a:schemeClr val="tx1"/>
+                </a:solidFill>
+                <a:latin typeface="+mn-lt"/>
+                <a:ea typeface="+mn-ea"/>
+                <a:cs typeface="+mn-cs"/>
+              </a:defRPr>
+            </a:lvl5pPr>
+            <a:lvl6pPr marL="2514600" indent="-228600" algn="l" defTabSz="914400" rtl="0" eaLnBrk="1" latinLnBrk="0" hangingPunct="1">
+              <a:lnSpc>
+                <a:spcPct val="90000"/>
+              </a:lnSpc>
+              <a:spcBef>
+                <a:spcPts val="500"/>
+              </a:spcBef>
+              <a:buFont typeface="Arial" panose="020B0604020202020204" pitchFamily="34" charset="0"/>
+              <a:buChar char="•"/>
+              <a:defRPr sz="1600" kern="1200">
+                <a:solidFill>
+                  <a:schemeClr val="tx1"/>
+                </a:solidFill>
+                <a:latin typeface="+mn-lt"/>
+                <a:ea typeface="+mn-ea"/>
+                <a:cs typeface="+mn-cs"/>
+              </a:defRPr>
+            </a:lvl6pPr>
+            <a:lvl7pPr marL="2971800" indent="-228600" algn="l" defTabSz="914400" rtl="0" eaLnBrk="1" latinLnBrk="0" hangingPunct="1">
+              <a:lnSpc>
+                <a:spcPct val="90000"/>
+              </a:lnSpc>
+              <a:spcBef>
+                <a:spcPts val="500"/>
+              </a:spcBef>
+              <a:buFont typeface="Arial" panose="020B0604020202020204" pitchFamily="34" charset="0"/>
+              <a:buChar char="•"/>
+              <a:defRPr sz="1600" kern="1200">
+                <a:solidFill>
+                  <a:schemeClr val="tx1"/>
+                </a:solidFill>
+                <a:latin typeface="+mn-lt"/>
+                <a:ea typeface="+mn-ea"/>
+                <a:cs typeface="+mn-cs"/>
+              </a:defRPr>
+            </a:lvl7pPr>
+            <a:lvl8pPr marL="3429000" indent="-228600" algn="l" defTabSz="914400" rtl="0" eaLnBrk="1" latinLnBrk="0" hangingPunct="1">
+              <a:lnSpc>
+                <a:spcPct val="90000"/>
+              </a:lnSpc>
+              <a:spcBef>
+                <a:spcPts val="500"/>
+              </a:spcBef>
+              <a:buFont typeface="Arial" panose="020B0604020202020204" pitchFamily="34" charset="0"/>
+              <a:buChar char="•"/>
+              <a:defRPr sz="1600" kern="1200">
+                <a:solidFill>
+                  <a:schemeClr val="tx1"/>
+                </a:solidFill>
+                <a:latin typeface="+mn-lt"/>
+                <a:ea typeface="+mn-ea"/>
+                <a:cs typeface="+mn-cs"/>
+              </a:defRPr>
+            </a:lvl8pPr>
+            <a:lvl9pPr marL="3886200" indent="-228600" algn="l" defTabSz="914400" rtl="0" eaLnBrk="1" latinLnBrk="0" hangingPunct="1">
+              <a:lnSpc>
+                <a:spcPct val="90000"/>
+              </a:lnSpc>
+              <a:spcBef>
+                <a:spcPts val="500"/>
+              </a:spcBef>
+              <a:buFont typeface="Arial" panose="020B0604020202020204" pitchFamily="34" charset="0"/>
+              <a:buChar char="•"/>
+              <a:defRPr sz="1600" kern="1200">
+                <a:solidFill>
+                  <a:schemeClr val="tx1"/>
+                </a:solidFill>
+                <a:latin typeface="+mn-lt"/>
+                <a:ea typeface="+mn-ea"/>
+                <a:cs typeface="+mn-cs"/>
+              </a:defRPr>
+            </a:lvl9pPr>
+          </a:lstStyle>
+          <a:p>
+            <a:r>
+              <a:rPr lang="en-US" b="1" dirty="0">
+                <a:solidFill>
+                  <a:schemeClr val="accent2"/>
+                </a:solidFill>
+              </a:rPr>
+              <a:t>Ansible</a:t>
+            </a:r>
+            <a:r>
+              <a:rPr lang="en-US" b="1" dirty="0"/>
+              <a:t> </a:t>
+            </a:r>
+            <a:r>
+              <a:rPr lang="en-US" dirty="0"/>
+              <a:t>– An automation language leveraging modules to be used in one or more tasks on managed systems. Most Ansible automation leverages and Ansible playbook which is a YAML formatted file containing Ansible directives.</a:t>
+            </a:r>
+          </a:p>
+          <a:p>
+            <a:endParaRPr lang="en-US" b="1" dirty="0"/>
+          </a:p>
+          <a:p>
+            <a:r>
+              <a:rPr lang="en-US" b="1" dirty="0">
+                <a:solidFill>
+                  <a:schemeClr val="accent2"/>
+                </a:solidFill>
+              </a:rPr>
+              <a:t>Ansible modules</a:t>
+            </a:r>
+            <a:r>
+              <a:rPr lang="en-US" dirty="0">
+                <a:solidFill>
+                  <a:schemeClr val="accent2"/>
+                </a:solidFill>
+              </a:rPr>
+              <a:t> </a:t>
+            </a:r>
+            <a:r>
+              <a:rPr lang="en-US" dirty="0"/>
+              <a:t>– Components used by Ansible tasks and playbooks which are generally implemented and developed in Python. Ansible modules work with certain system utilities and are optimized to be leveraged as a declarative automation language and provide idempotency.</a:t>
+            </a:r>
+          </a:p>
+          <a:p>
+            <a:endParaRPr lang="en-US" b="1" dirty="0"/>
+          </a:p>
+          <a:p>
+            <a:r>
+              <a:rPr lang="en-US" b="1" dirty="0">
+                <a:solidFill>
+                  <a:schemeClr val="accent2"/>
+                </a:solidFill>
+              </a:rPr>
+              <a:t>Ansible ad-hoc commands</a:t>
+            </a:r>
+            <a:r>
+              <a:rPr lang="en-US" dirty="0">
+                <a:solidFill>
+                  <a:schemeClr val="accent2"/>
+                </a:solidFill>
+              </a:rPr>
+              <a:t> </a:t>
+            </a:r>
+            <a:r>
+              <a:rPr lang="en-US" dirty="0"/>
+              <a:t>– A way of executing a single Ansible task quickly that relies on a single Ansible module to perform the tests/changes of the task. </a:t>
+            </a:r>
+            <a:endParaRPr lang="en-US" b="1" dirty="0"/>
+          </a:p>
+        </p:txBody>
+      </p:sp>
     </p:spTree>
     <p:extLst>
       <p:ext uri="{BB962C8B-B14F-4D97-AF65-F5344CB8AC3E}">
@@ -6560,7 +8326,12 @@
             <p:ph type="title"/>
           </p:nvPr>
         </p:nvSpPr>
-        <p:spPr/>
+        <p:spPr>
+          <a:xfrm>
+            <a:off x="3048000" y="367748"/>
+            <a:ext cx="8610600" cy="1293028"/>
+          </a:xfrm>
+        </p:spPr>
         <p:txBody>
           <a:bodyPr/>
           <a:lstStyle/>
@@ -6590,22 +8361,30 @@
         </p:nvSpPr>
         <p:spPr>
           <a:xfrm>
-            <a:off x="288235" y="2194560"/>
-            <a:ext cx="11370365" cy="4295692"/>
+            <a:off x="288235" y="1779373"/>
+            <a:ext cx="11611322" cy="4710879"/>
           </a:xfrm>
         </p:spPr>
         <p:txBody>
           <a:bodyPr>
-            <a:normAutofit lnSpcReduction="10000"/>
+            <a:normAutofit fontScale="92500"/>
           </a:bodyPr>
           <a:lstStyle/>
           <a:p>
             <a:r>
-              <a:rPr lang="en-US" b="1" dirty="0" err="1"/>
+              <a:rPr lang="en-US" b="1" dirty="0" err="1">
+                <a:solidFill>
+                  <a:schemeClr val="accent2"/>
+                </a:solidFill>
+              </a:rPr>
               <a:t>ansible.cfg</a:t>
             </a:r>
             <a:r>
-              <a:rPr lang="en-US" b="1" dirty="0"/>
+              <a:rPr lang="en-US" b="1" dirty="0">
+                <a:solidFill>
+                  <a:schemeClr val="accent2"/>
+                </a:solidFill>
+              </a:rPr>
               <a:t> </a:t>
             </a:r>
             <a:r>
@@ -6631,7 +8410,11 @@
           </a:p>
           <a:p>
             <a:r>
-              <a:rPr lang="en-US" b="1" dirty="0"/>
+              <a:rPr lang="en-US" b="1" dirty="0">
+                <a:solidFill>
+                  <a:schemeClr val="accent2"/>
+                </a:solidFill>
+              </a:rPr>
               <a:t>Inventory</a:t>
             </a:r>
             <a:r>
@@ -6657,7 +8440,11 @@
           </a:p>
           <a:p>
             <a:r>
-              <a:rPr lang="en-US" b="1" dirty="0"/>
+              <a:rPr lang="en-US" b="1" dirty="0">
+                <a:solidFill>
+                  <a:schemeClr val="accent2"/>
+                </a:solidFill>
+              </a:rPr>
               <a:t>ansible</a:t>
             </a:r>
             <a:r>
@@ -6667,7 +8454,11 @@
           </a:p>
           <a:p>
             <a:r>
-              <a:rPr lang="en-US" b="1" dirty="0"/>
+              <a:rPr lang="en-US" b="1" dirty="0">
+                <a:solidFill>
+                  <a:schemeClr val="accent2"/>
+                </a:solidFill>
+              </a:rPr>
               <a:t>ansible-playbook</a:t>
             </a:r>
             <a:r>
@@ -6677,7 +8468,11 @@
           </a:p>
           <a:p>
             <a:r>
-              <a:rPr lang="en-US" b="1" dirty="0"/>
+              <a:rPr lang="en-US" b="1" dirty="0">
+                <a:solidFill>
+                  <a:schemeClr val="accent2"/>
+                </a:solidFill>
+              </a:rPr>
               <a:t>ansible-galaxy</a:t>
             </a:r>
             <a:r>
@@ -6694,7 +8489,11 @@
           </a:p>
           <a:p>
             <a:r>
-              <a:rPr lang="en-US" b="1" dirty="0"/>
+              <a:rPr lang="en-US" b="1" dirty="0">
+                <a:solidFill>
+                  <a:schemeClr val="accent2"/>
+                </a:solidFill>
+              </a:rPr>
               <a:t>Playbook</a:t>
             </a:r>
             <a:r>
@@ -6704,12 +8503,30 @@
           </a:p>
           <a:p>
             <a:r>
-              <a:rPr lang="en-US" b="1" dirty="0"/>
+              <a:rPr lang="en-US" b="1" dirty="0">
+                <a:solidFill>
+                  <a:schemeClr val="accent2"/>
+                </a:solidFill>
+              </a:rPr>
               <a:t>Task</a:t>
             </a:r>
             <a:r>
               <a:rPr lang="en-US" dirty="0"/>
               <a:t> – Collection/list of Ansible modules arranged into instructions. Each task utilizes an Ansible module to perform a given action.</a:t>
+            </a:r>
+          </a:p>
+          <a:p>
+            <a:r>
+              <a:rPr lang="en-US" b="1" dirty="0">
+                <a:solidFill>
+                  <a:schemeClr val="accent2"/>
+                </a:solidFill>
+              </a:rPr>
+              <a:t>Ansible Module </a:t>
+            </a:r>
+            <a:r>
+              <a:rPr lang="en-US" dirty="0"/>
+              <a:t>– Specific module (small program generally implemented in Python) which perform the commands and executes the program to get the desired state of a given task.</a:t>
             </a:r>
             <a:endParaRPr lang="en-US" b="1" dirty="0"/>
           </a:p>
@@ -6840,15 +8657,27 @@
               <a:buChar char="Ø"/>
             </a:pPr>
             <a:r>
-              <a:rPr lang="en-US" b="1" dirty="0"/>
+              <a:rPr lang="en-US" b="1" dirty="0">
+                <a:solidFill>
+                  <a:schemeClr val="accent2"/>
+                </a:solidFill>
+              </a:rPr>
               <a:t>./</a:t>
             </a:r>
             <a:r>
-              <a:rPr lang="en-US" b="1" dirty="0" err="1"/>
+              <a:rPr lang="en-US" b="1" dirty="0" err="1">
+                <a:solidFill>
+                  <a:schemeClr val="accent2"/>
+                </a:solidFill>
+              </a:rPr>
               <a:t>ansible.cfg</a:t>
             </a:r>
             <a:r>
-              <a:rPr lang="en-US" b="1" dirty="0"/>
+              <a:rPr lang="en-US" b="1" dirty="0">
+                <a:solidFill>
+                  <a:schemeClr val="accent2"/>
+                </a:solidFill>
+              </a:rPr>
               <a:t> </a:t>
             </a:r>
             <a:r>
@@ -6862,15 +8691,27 @@
               <a:buChar char="Ø"/>
             </a:pPr>
             <a:r>
-              <a:rPr lang="en-US" b="1" dirty="0"/>
+              <a:rPr lang="en-US" b="1" dirty="0">
+                <a:solidFill>
+                  <a:schemeClr val="accent2"/>
+                </a:solidFill>
+              </a:rPr>
               <a:t>~/.</a:t>
             </a:r>
             <a:r>
-              <a:rPr lang="en-US" b="1" dirty="0" err="1"/>
+              <a:rPr lang="en-US" b="1" dirty="0" err="1">
+                <a:solidFill>
+                  <a:schemeClr val="accent2"/>
+                </a:solidFill>
+              </a:rPr>
               <a:t>ansible.cfg</a:t>
             </a:r>
             <a:r>
-              <a:rPr lang="en-US" b="1" dirty="0"/>
+              <a:rPr lang="en-US" b="1" dirty="0">
+                <a:solidFill>
+                  <a:schemeClr val="accent2"/>
+                </a:solidFill>
+              </a:rPr>
               <a:t> </a:t>
             </a:r>
             <a:r>
@@ -6892,23 +8733,43 @@
               <a:buChar char="Ø"/>
             </a:pPr>
             <a:r>
-              <a:rPr lang="en-US" b="1" dirty="0"/>
+              <a:rPr lang="en-US" b="1" dirty="0">
+                <a:solidFill>
+                  <a:schemeClr val="accent2"/>
+                </a:solidFill>
+              </a:rPr>
               <a:t>/</a:t>
             </a:r>
             <a:r>
-              <a:rPr lang="en-US" b="1" dirty="0" err="1"/>
+              <a:rPr lang="en-US" b="1" dirty="0" err="1">
+                <a:solidFill>
+                  <a:schemeClr val="accent2"/>
+                </a:solidFill>
+              </a:rPr>
               <a:t>etc</a:t>
             </a:r>
             <a:r>
-              <a:rPr lang="en-US" b="1" dirty="0"/>
+              <a:rPr lang="en-US" b="1" dirty="0">
+                <a:solidFill>
+                  <a:schemeClr val="accent2"/>
+                </a:solidFill>
+              </a:rPr>
               <a:t>/ansible/</a:t>
             </a:r>
             <a:r>
-              <a:rPr lang="en-US" b="1" dirty="0" err="1"/>
+              <a:rPr lang="en-US" b="1" dirty="0" err="1">
+                <a:solidFill>
+                  <a:schemeClr val="accent2"/>
+                </a:solidFill>
+              </a:rPr>
               <a:t>ansible.cfg</a:t>
             </a:r>
             <a:r>
-              <a:rPr lang="en-US" b="1" dirty="0"/>
+              <a:rPr lang="en-US" b="1" dirty="0">
+                <a:solidFill>
+                  <a:schemeClr val="accent2"/>
+                </a:solidFill>
+              </a:rPr>
               <a:t> </a:t>
             </a:r>
             <a:r>
@@ -7554,6 +9415,258 @@
               <a:rPr lang="en-US" dirty="0"/>
               <a:t>Creating an Ansible ROLE</a:t>
             </a:r>
+          </a:p>
+        </p:txBody>
+      </p:sp>
+      <p:sp>
+        <p:nvSpPr>
+          <p:cNvPr id="3" name="TextBox 2">
+            <a:extLst>
+              <a:ext uri="{FF2B5EF4-FFF2-40B4-BE49-F238E27FC236}">
+                <a16:creationId xmlns:a16="http://schemas.microsoft.com/office/drawing/2014/main" id="{AFAE4272-C6A2-884B-B73D-9F60EB8217CA}"/>
+              </a:ext>
+            </a:extLst>
+          </p:cNvPr>
+          <p:cNvSpPr txBox="1"/>
+          <p:nvPr/>
+        </p:nvSpPr>
+        <p:spPr>
+          <a:xfrm>
+            <a:off x="1467678" y="4800600"/>
+            <a:ext cx="10038522" cy="646331"/>
+          </a:xfrm>
+          <a:prstGeom prst="rect">
+            <a:avLst/>
+          </a:prstGeom>
+          <a:solidFill>
+            <a:schemeClr val="bg2">
+              <a:lumMod val="20000"/>
+              <a:lumOff val="80000"/>
+            </a:schemeClr>
+          </a:solidFill>
+        </p:spPr>
+        <p:txBody>
+          <a:bodyPr wrap="square" rtlCol="0">
+            <a:spAutoFit/>
+          </a:bodyPr>
+          <a:lstStyle/>
+          <a:p>
+            <a:r>
+              <a:rPr lang="en-US" dirty="0">
+                <a:solidFill>
+                  <a:schemeClr val="bg1"/>
+                </a:solidFill>
+              </a:rPr>
+              <a:t>[</a:t>
+            </a:r>
+            <a:r>
+              <a:rPr lang="en-US" dirty="0" err="1">
+                <a:solidFill>
+                  <a:schemeClr val="bg1"/>
+                </a:solidFill>
+              </a:rPr>
+              <a:t>student@workstation</a:t>
+            </a:r>
+            <a:r>
+              <a:rPr lang="en-US" dirty="0">
+                <a:solidFill>
+                  <a:schemeClr val="bg1"/>
+                </a:solidFill>
+              </a:rPr>
+              <a:t> ~]$ ansible-galaxy </a:t>
+            </a:r>
+            <a:r>
+              <a:rPr lang="en-US" dirty="0" err="1">
+                <a:solidFill>
+                  <a:schemeClr val="bg1"/>
+                </a:solidFill>
+              </a:rPr>
+              <a:t>init</a:t>
+            </a:r>
+            <a:r>
+              <a:rPr lang="en-US" dirty="0">
+                <a:solidFill>
+                  <a:schemeClr val="bg1"/>
+                </a:solidFill>
+              </a:rPr>
+              <a:t> </a:t>
+            </a:r>
+            <a:r>
+              <a:rPr lang="en-US" dirty="0" err="1">
+                <a:solidFill>
+                  <a:schemeClr val="bg1"/>
+                </a:solidFill>
+              </a:rPr>
+              <a:t>My_Role</a:t>
+            </a:r>
+            <a:endParaRPr lang="en-US" dirty="0">
+              <a:solidFill>
+                <a:schemeClr val="bg1"/>
+              </a:solidFill>
+            </a:endParaRPr>
+          </a:p>
+          <a:p>
+            <a:r>
+              <a:rPr lang="en-US" dirty="0">
+                <a:solidFill>
+                  <a:schemeClr val="bg1"/>
+                </a:solidFill>
+              </a:rPr>
+              <a:t>- </a:t>
+            </a:r>
+            <a:r>
+              <a:rPr lang="en-US" dirty="0" err="1">
+                <a:solidFill>
+                  <a:schemeClr val="bg1"/>
+                </a:solidFill>
+              </a:rPr>
+              <a:t>My_Role</a:t>
+            </a:r>
+            <a:r>
+              <a:rPr lang="en-US" dirty="0">
+                <a:solidFill>
+                  <a:schemeClr val="bg1"/>
+                </a:solidFill>
+              </a:rPr>
+              <a:t> was created successfully</a:t>
+            </a:r>
+          </a:p>
+        </p:txBody>
+      </p:sp>
+      <p:sp>
+        <p:nvSpPr>
+          <p:cNvPr id="4" name="TextBox 3">
+            <a:extLst>
+              <a:ext uri="{FF2B5EF4-FFF2-40B4-BE49-F238E27FC236}">
+                <a16:creationId xmlns:a16="http://schemas.microsoft.com/office/drawing/2014/main" id="{9987E24B-DFBE-004F-A6B6-879324835B2C}"/>
+              </a:ext>
+            </a:extLst>
+          </p:cNvPr>
+          <p:cNvSpPr txBox="1"/>
+          <p:nvPr/>
+        </p:nvSpPr>
+        <p:spPr>
+          <a:xfrm>
+            <a:off x="1076739" y="2239330"/>
+            <a:ext cx="10038522" cy="2031325"/>
+          </a:xfrm>
+          <a:prstGeom prst="rect">
+            <a:avLst/>
+          </a:prstGeom>
+          <a:noFill/>
+        </p:spPr>
+        <p:txBody>
+          <a:bodyPr wrap="square" rtlCol="0">
+            <a:spAutoFit/>
+          </a:bodyPr>
+          <a:lstStyle/>
+          <a:p>
+            <a:pPr marL="285750" indent="-285750">
+              <a:buFont typeface="Wingdings" pitchFamily="2" charset="2"/>
+              <a:buChar char="Ø"/>
+            </a:pPr>
+            <a:r>
+              <a:rPr lang="en-US" dirty="0"/>
+              <a:t>Use the </a:t>
+            </a:r>
+            <a:r>
+              <a:rPr lang="en-US" b="1" dirty="0"/>
+              <a:t>ansible-galaxy </a:t>
+            </a:r>
+            <a:r>
+              <a:rPr lang="en-US" b="1" dirty="0" err="1"/>
+              <a:t>init</a:t>
+            </a:r>
+            <a:r>
+              <a:rPr lang="en-US" b="1" dirty="0"/>
+              <a:t> &lt;</a:t>
+            </a:r>
+            <a:r>
+              <a:rPr lang="en-US" b="1" dirty="0" err="1"/>
+              <a:t>RoleName</a:t>
+            </a:r>
+            <a:r>
+              <a:rPr lang="en-US" b="1" dirty="0"/>
+              <a:t>&gt;</a:t>
+            </a:r>
+            <a:r>
+              <a:rPr lang="en-US" dirty="0"/>
+              <a:t> command to create a Role</a:t>
+            </a:r>
+          </a:p>
+          <a:p>
+            <a:pPr marL="285750" indent="-285750">
+              <a:buFont typeface="Wingdings" pitchFamily="2" charset="2"/>
+              <a:buChar char="Ø"/>
+            </a:pPr>
+            <a:r>
+              <a:rPr lang="en-US" dirty="0"/>
+              <a:t>Empty directories or unused directories can be deleted to clean up the Role</a:t>
+            </a:r>
+          </a:p>
+          <a:p>
+            <a:pPr marL="285750" indent="-285750">
+              <a:buFont typeface="Wingdings" pitchFamily="2" charset="2"/>
+              <a:buChar char="Ø"/>
+            </a:pPr>
+            <a:r>
+              <a:rPr lang="en-US" dirty="0"/>
+              <a:t>Populate the various Role structures</a:t>
+            </a:r>
+          </a:p>
+          <a:p>
+            <a:pPr marL="742950" lvl="1" indent="-285750">
+              <a:buFont typeface="Arial" panose="020B0604020202020204" pitchFamily="34" charset="0"/>
+              <a:buChar char="•"/>
+            </a:pPr>
+            <a:r>
+              <a:rPr lang="en-US" dirty="0"/>
+              <a:t>Must have the following components (at minimum):</a:t>
+            </a:r>
+          </a:p>
+          <a:p>
+            <a:pPr marL="1200150" lvl="2" indent="-285750">
+              <a:buFont typeface="Courier New" panose="02070309020205020404" pitchFamily="49" charset="0"/>
+              <a:buChar char="o"/>
+            </a:pPr>
+            <a:r>
+              <a:rPr lang="en-US" dirty="0" err="1"/>
+              <a:t>README.md</a:t>
+            </a:r>
+            <a:endParaRPr lang="en-US" dirty="0"/>
+          </a:p>
+          <a:p>
+            <a:pPr marL="1200150" lvl="2" indent="-285750">
+              <a:buFont typeface="Courier New" panose="02070309020205020404" pitchFamily="49" charset="0"/>
+              <a:buChar char="o"/>
+            </a:pPr>
+            <a:r>
+              <a:rPr lang="en-US" dirty="0"/>
+              <a:t>meta/</a:t>
+            </a:r>
+            <a:r>
+              <a:rPr lang="en-US" dirty="0" err="1"/>
+              <a:t>main.yaml</a:t>
+            </a:r>
+            <a:r>
+              <a:rPr lang="en-US" dirty="0"/>
+              <a:t> </a:t>
+            </a:r>
+          </a:p>
+          <a:p>
+            <a:pPr marL="1200150" lvl="2" indent="-285750">
+              <a:buFont typeface="Courier New" panose="02070309020205020404" pitchFamily="49" charset="0"/>
+              <a:buChar char="o"/>
+            </a:pPr>
+            <a:r>
+              <a:rPr lang="en-US" dirty="0"/>
+              <a:t>tasks/</a:t>
+            </a:r>
+            <a:r>
+              <a:rPr lang="en-US" dirty="0" err="1"/>
+              <a:t>main.yaml</a:t>
+            </a:r>
+            <a:endParaRPr lang="en-US" dirty="0"/>
           </a:p>
         </p:txBody>
       </p:sp>

</xml_diff>